<commit_message>
Conclusão do segundo cenário
</commit_message>
<xml_diff>
--- a/Artefatos/15 -Arquitetura de Negócio para cada Cenário.pptx
+++ b/Artefatos/15 -Arquitetura de Negócio para cada Cenário.pptx
@@ -11,6 +11,7 @@
     <p:sldId id="256" r:id="rId6"/>
     <p:sldId id="257" r:id="rId7"/>
     <p:sldId id="258" r:id="rId8"/>
+    <p:sldId id="259" r:id="rId9"/>
   </p:sldIdLst>
   <p:sldSz cy="5143500" cx="9144000"/>
   <p:notesSz cx="6858000" cy="9144000"/>
@@ -792,7 +793,7 @@
   <p:cSld>
     <p:spTree>
       <p:nvGrpSpPr>
-        <p:cNvPr id="62" name="Shape 62"/>
+        <p:cNvPr id="61" name="Shape 61"/>
         <p:cNvGrpSpPr/>
         <p:nvPr/>
       </p:nvGrpSpPr>
@@ -806,7 +807,7 @@
       </p:grpSpPr>
       <p:sp>
         <p:nvSpPr>
-          <p:cNvPr id="63" name="Google Shape;63;g951f6f1f16_0_0:notes"/>
+          <p:cNvPr id="62" name="Google Shape;62;g951f6f1f16_0_0:notes"/>
           <p:cNvSpPr/>
           <p:nvPr>
             <p:ph idx="2" type="sldImg"/>
@@ -841,7 +842,7 @@
       </p:sp>
       <p:sp>
         <p:nvSpPr>
-          <p:cNvPr id="64" name="Google Shape;64;g951f6f1f16_0_0:notes"/>
+          <p:cNvPr id="63" name="Google Shape;63;g951f6f1f16_0_0:notes"/>
           <p:cNvSpPr txBox="1"/>
           <p:nvPr>
             <p:ph idx="1" type="body"/>
@@ -891,7 +892,7 @@
   <p:cSld>
     <p:spTree>
       <p:nvGrpSpPr>
-        <p:cNvPr id="80" name="Shape 80"/>
+        <p:cNvPr id="79" name="Shape 79"/>
         <p:cNvGrpSpPr/>
         <p:nvPr/>
       </p:nvGrpSpPr>
@@ -905,7 +906,7 @@
       </p:grpSpPr>
       <p:sp>
         <p:nvSpPr>
-          <p:cNvPr id="81" name="Google Shape;81;g951f6f1f16_1_13:notes"/>
+          <p:cNvPr id="80" name="Google Shape;80;ga457dfcee5_0_0:notes"/>
           <p:cNvSpPr/>
           <p:nvPr>
             <p:ph idx="2" type="sldImg"/>
@@ -940,7 +941,106 @@
       </p:sp>
       <p:sp>
         <p:nvSpPr>
-          <p:cNvPr id="82" name="Google Shape;82;g951f6f1f16_1_13:notes"/>
+          <p:cNvPr id="81" name="Google Shape;81;ga457dfcee5_0_0:notes"/>
+          <p:cNvSpPr txBox="1"/>
+          <p:nvPr>
+            <p:ph idx="1" type="body"/>
+          </p:nvPr>
+        </p:nvSpPr>
+        <p:spPr>
+          <a:xfrm>
+            <a:off x="685800" y="4343400"/>
+            <a:ext cx="5486400" cy="4114800"/>
+          </a:xfrm>
+          <a:prstGeom prst="rect">
+            <a:avLst/>
+          </a:prstGeom>
+        </p:spPr>
+        <p:txBody>
+          <a:bodyPr anchorCtr="0" anchor="t" bIns="91425" lIns="91425" spcFirstLastPara="1" rIns="91425" wrap="square" tIns="91425">
+            <a:noAutofit/>
+          </a:bodyPr>
+          <a:lstStyle/>
+          <a:p>
+            <a:pPr indent="0" lvl="0" marL="0" rtl="0" algn="l">
+              <a:spcBef>
+                <a:spcPts val="0"/>
+              </a:spcBef>
+              <a:spcAft>
+                <a:spcPts val="0"/>
+              </a:spcAft>
+              <a:buNone/>
+            </a:pPr>
+            <a:r>
+              <a:t/>
+            </a:r>
+            <a:endParaRPr/>
+          </a:p>
+        </p:txBody>
+      </p:sp>
+    </p:spTree>
+  </p:cSld>
+  <p:clrMapOvr>
+    <a:masterClrMapping/>
+  </p:clrMapOvr>
+</p:notes>
+</file>
+
+<file path=ppt/notesSlides/notesSlide4.xml><?xml version="1.0" encoding="utf-8"?>
+<p:notes xmlns:a="http://schemas.openxmlformats.org/drawingml/2006/main" xmlns:r="http://schemas.openxmlformats.org/officeDocument/2006/relationships" xmlns:mc="http://schemas.openxmlformats.org/markup-compatibility/2006" xmlns:mv="urn:schemas-microsoft-com:mac:vml" xmlns:p="http://schemas.openxmlformats.org/presentationml/2006/main" xmlns:c="http://schemas.openxmlformats.org/drawingml/2006/chart" xmlns:dgm="http://schemas.openxmlformats.org/drawingml/2006/diagram" xmlns:o="urn:schemas-microsoft-com:office:office" xmlns:v="urn:schemas-microsoft-com:vml" xmlns:pvml="urn:schemas-microsoft-com:office:powerpoint" xmlns:com="http://schemas.openxmlformats.org/drawingml/2006/compatibility" xmlns:p14="http://schemas.microsoft.com/office/powerpoint/2010/main" xmlns:p15="http://schemas.microsoft.com/office/powerpoint/2012/main" xmlns:ahyp="http://schemas.microsoft.com/office/drawing/2018/hyperlinkcolor" showMasterPhAnim="0" showMasterSp="0">
+  <p:cSld>
+    <p:spTree>
+      <p:nvGrpSpPr>
+        <p:cNvPr id="97" name="Shape 97"/>
+        <p:cNvGrpSpPr/>
+        <p:nvPr/>
+      </p:nvGrpSpPr>
+      <p:grpSpPr>
+        <a:xfrm>
+          <a:off x="0" y="0"/>
+          <a:ext cx="0" cy="0"/>
+          <a:chOff x="0" y="0"/>
+          <a:chExt cx="0" cy="0"/>
+        </a:xfrm>
+      </p:grpSpPr>
+      <p:sp>
+        <p:nvSpPr>
+          <p:cNvPr id="98" name="Google Shape;98;g951f6f1f16_1_13:notes"/>
+          <p:cNvSpPr/>
+          <p:nvPr>
+            <p:ph idx="2" type="sldImg"/>
+          </p:nvPr>
+        </p:nvSpPr>
+        <p:spPr>
+          <a:xfrm>
+            <a:off x="381300" y="685800"/>
+            <a:ext cx="6096000" cy="3429000"/>
+          </a:xfrm>
+          <a:custGeom>
+            <a:rect b="b" l="l" r="r" t="t"/>
+            <a:pathLst>
+              <a:path extrusionOk="0" h="120000" w="120000">
+                <a:moveTo>
+                  <a:pt x="0" y="0"/>
+                </a:moveTo>
+                <a:lnTo>
+                  <a:pt x="120000" y="0"/>
+                </a:lnTo>
+                <a:lnTo>
+                  <a:pt x="120000" y="120000"/>
+                </a:lnTo>
+                <a:lnTo>
+                  <a:pt x="0" y="120000"/>
+                </a:lnTo>
+                <a:close/>
+              </a:path>
+            </a:pathLst>
+          </a:custGeom>
+        </p:spPr>
+      </p:sp>
+      <p:sp>
+        <p:nvSpPr>
+          <p:cNvPr id="99" name="Google Shape;99;g951f6f1f16_1_13:notes"/>
           <p:cNvSpPr txBox="1"/>
           <p:nvPr>
             <p:ph idx="1" type="body"/>
@@ -5924,8 +6024,8 @@
         </p:nvSpPr>
         <p:spPr>
           <a:xfrm>
-            <a:off x="3966300" y="2173300"/>
-            <a:ext cx="7345800" cy="857100"/>
+            <a:off x="2535550" y="1640675"/>
+            <a:ext cx="3394500" cy="692700"/>
           </a:xfrm>
           <a:prstGeom prst="rect">
             <a:avLst/>
@@ -5951,53 +6051,12 @@
               <a:buNone/>
             </a:pPr>
             <a:r>
-              <a:t/>
-            </a:r>
-            <a:endParaRPr/>
-          </a:p>
-        </p:txBody>
-      </p:sp>
-      <p:sp>
-        <p:nvSpPr>
-          <p:cNvPr id="61" name="Google Shape;61;p13"/>
-          <p:cNvSpPr txBox="1"/>
-          <p:nvPr/>
-        </p:nvSpPr>
-        <p:spPr>
-          <a:xfrm>
-            <a:off x="2535550" y="1767450"/>
-            <a:ext cx="3394500" cy="692700"/>
-          </a:xfrm>
-          <a:prstGeom prst="rect">
-            <a:avLst/>
-          </a:prstGeom>
-          <a:noFill/>
-          <a:ln>
-            <a:noFill/>
-          </a:ln>
-        </p:spPr>
-        <p:txBody>
-          <a:bodyPr anchorCtr="0" anchor="t" bIns="91425" lIns="91425" spcFirstLastPara="1" rIns="91425" wrap="square" tIns="91425">
-            <a:noAutofit/>
-          </a:bodyPr>
-          <a:lstStyle/>
-          <a:p>
-            <a:pPr indent="0" lvl="0" marL="0" rtl="0" algn="l">
-              <a:spcBef>
-                <a:spcPts val="0"/>
-              </a:spcBef>
-              <a:spcAft>
-                <a:spcPts val="0"/>
-              </a:spcAft>
-              <a:buNone/>
-            </a:pPr>
-            <a:r>
               <a:rPr lang="pt-BR"/>
               <a:t>1. </a:t>
             </a:r>
             <a:r>
               <a:rPr lang="pt-BR"/>
-              <a:t>Comprar produtos Herbalife.</a:t>
+              <a:t>Comprar produtos fracionados.</a:t>
             </a:r>
             <a:endParaRPr/>
           </a:p>
@@ -6013,7 +6072,31 @@
             </a:pPr>
             <a:r>
               <a:rPr lang="pt-BR"/>
-              <a:t>2. Envia </a:t>
+              <a:t>2. </a:t>
+            </a:r>
+            <a:r>
+              <a:rPr lang="pt-BR">
+                <a:solidFill>
+                  <a:schemeClr val="dk1"/>
+                </a:solidFill>
+              </a:rPr>
+              <a:t>Comprar produtos inteiros.</a:t>
+            </a:r>
+            <a:endParaRPr/>
+          </a:p>
+          <a:p>
+            <a:pPr indent="0" lvl="0" marL="0" rtl="0" algn="l">
+              <a:spcBef>
+                <a:spcPts val="0"/>
+              </a:spcBef>
+              <a:spcAft>
+                <a:spcPts val="0"/>
+              </a:spcAft>
+              <a:buNone/>
+            </a:pPr>
+            <a:r>
+              <a:rPr lang="pt-BR"/>
+              <a:t>3. Envia </a:t>
             </a:r>
             <a:r>
               <a:rPr lang="pt-BR"/>
@@ -6040,7 +6123,7 @@
   <p:cSld>
     <p:spTree>
       <p:nvGrpSpPr>
-        <p:cNvPr id="65" name="Shape 65"/>
+        <p:cNvPr id="64" name="Shape 64"/>
         <p:cNvGrpSpPr/>
         <p:nvPr/>
       </p:nvGrpSpPr>
@@ -6054,7 +6137,7 @@
       </p:grpSpPr>
       <p:sp>
         <p:nvSpPr>
-          <p:cNvPr id="66" name="Google Shape;66;p14"/>
+          <p:cNvPr id="65" name="Google Shape;65;p14"/>
           <p:cNvSpPr txBox="1"/>
           <p:nvPr/>
         </p:nvSpPr>
@@ -6092,7 +6175,7 @@
             </a:r>
             <a:r>
               <a:rPr lang="pt-BR" sz="2200"/>
-              <a:t>Comprar produtos Herbalife</a:t>
+              <a:t>Comprar produtos fracionados</a:t>
             </a:r>
             <a:endParaRPr sz="2200"/>
           </a:p>
@@ -6100,7 +6183,7 @@
       </p:sp>
       <p:sp>
         <p:nvSpPr>
-          <p:cNvPr id="67" name="Google Shape;67;p14"/>
+          <p:cNvPr id="66" name="Google Shape;66;p14"/>
           <p:cNvSpPr/>
           <p:nvPr/>
         </p:nvSpPr>
@@ -6149,7 +6232,7 @@
       </p:sp>
       <p:sp>
         <p:nvSpPr>
-          <p:cNvPr id="68" name="Google Shape;68;p14"/>
+          <p:cNvPr id="67" name="Google Shape;67;p14"/>
           <p:cNvSpPr/>
           <p:nvPr/>
         </p:nvSpPr>
@@ -6202,7 +6285,7 @@
       </p:sp>
       <p:sp>
         <p:nvSpPr>
-          <p:cNvPr id="69" name="Google Shape;69;p14"/>
+          <p:cNvPr id="68" name="Google Shape;68;p14"/>
           <p:cNvSpPr txBox="1"/>
           <p:nvPr/>
         </p:nvSpPr>
@@ -6252,7 +6335,7 @@
       </p:sp>
       <p:sp>
         <p:nvSpPr>
-          <p:cNvPr id="70" name="Google Shape;70;p14"/>
+          <p:cNvPr id="69" name="Google Shape;69;p14"/>
           <p:cNvSpPr/>
           <p:nvPr/>
         </p:nvSpPr>
@@ -6303,10 +6386,10 @@
       </p:sp>
       <p:cxnSp>
         <p:nvCxnSpPr>
-          <p:cNvPr id="71" name="Google Shape;71;p14"/>
+          <p:cNvPr id="70" name="Google Shape;70;p14"/>
           <p:cNvCxnSpPr>
-            <a:stCxn id="68" idx="3"/>
-            <a:endCxn id="70" idx="2"/>
+            <a:stCxn id="67" idx="3"/>
+            <a:endCxn id="69" idx="2"/>
           </p:cNvCxnSpPr>
           <p:nvPr/>
         </p:nvCxnSpPr>
@@ -6332,7 +6415,7 @@
       </p:cxnSp>
       <p:sp>
         <p:nvSpPr>
-          <p:cNvPr id="72" name="Google Shape;72;p14"/>
+          <p:cNvPr id="71" name="Google Shape;71;p14"/>
           <p:cNvSpPr/>
           <p:nvPr/>
         </p:nvSpPr>
@@ -6359,6 +6442,47 @@
         </p:spPr>
         <p:txBody>
           <a:bodyPr anchorCtr="0" anchor="ctr" bIns="91425" lIns="91425" spcFirstLastPara="1" rIns="91425" wrap="square" tIns="91425">
+            <a:noAutofit/>
+          </a:bodyPr>
+          <a:lstStyle/>
+          <a:p>
+            <a:pPr indent="0" lvl="0" marL="0" rtl="0" algn="l">
+              <a:spcBef>
+                <a:spcPts val="0"/>
+              </a:spcBef>
+              <a:spcAft>
+                <a:spcPts val="0"/>
+              </a:spcAft>
+              <a:buNone/>
+            </a:pPr>
+            <a:r>
+              <a:t/>
+            </a:r>
+            <a:endParaRPr/>
+          </a:p>
+        </p:txBody>
+      </p:sp>
+      <p:sp>
+        <p:nvSpPr>
+          <p:cNvPr id="72" name="Google Shape;72;p14"/>
+          <p:cNvSpPr txBox="1"/>
+          <p:nvPr/>
+        </p:nvSpPr>
+        <p:spPr>
+          <a:xfrm>
+            <a:off x="7588475" y="3024525"/>
+            <a:ext cx="7345800" cy="857100"/>
+          </a:xfrm>
+          <a:prstGeom prst="rect">
+            <a:avLst/>
+          </a:prstGeom>
+          <a:noFill/>
+          <a:ln>
+            <a:noFill/>
+          </a:ln>
+        </p:spPr>
+        <p:txBody>
+          <a:bodyPr anchorCtr="0" anchor="t" bIns="91425" lIns="91425" spcFirstLastPara="1" rIns="91425" wrap="square" tIns="91425">
             <a:noAutofit/>
           </a:bodyPr>
           <a:lstStyle/>
@@ -6387,8 +6511,8 @@
         </p:nvSpPr>
         <p:spPr>
           <a:xfrm>
-            <a:off x="7588475" y="3024525"/>
-            <a:ext cx="7345800" cy="857100"/>
+            <a:off x="6938950" y="2848225"/>
+            <a:ext cx="928200" cy="538200"/>
           </a:xfrm>
           <a:prstGeom prst="rect">
             <a:avLst/>
@@ -6414,49 +6538,8 @@
               <a:buNone/>
             </a:pPr>
             <a:r>
-              <a:t/>
-            </a:r>
-            <a:endParaRPr/>
-          </a:p>
-        </p:txBody>
-      </p:sp>
-      <p:sp>
-        <p:nvSpPr>
-          <p:cNvPr id="74" name="Google Shape;74;p14"/>
-          <p:cNvSpPr txBox="1"/>
-          <p:nvPr/>
-        </p:nvSpPr>
-        <p:spPr>
-          <a:xfrm>
-            <a:off x="6938950" y="2848225"/>
-            <a:ext cx="928200" cy="538200"/>
-          </a:xfrm>
-          <a:prstGeom prst="rect">
-            <a:avLst/>
-          </a:prstGeom>
-          <a:noFill/>
-          <a:ln>
-            <a:noFill/>
-          </a:ln>
-        </p:spPr>
-        <p:txBody>
-          <a:bodyPr anchorCtr="0" anchor="t" bIns="91425" lIns="91425" spcFirstLastPara="1" rIns="91425" wrap="square" tIns="91425">
-            <a:noAutofit/>
-          </a:bodyPr>
-          <a:lstStyle/>
-          <a:p>
-            <a:pPr indent="0" lvl="0" marL="0" rtl="0" algn="l">
-              <a:spcBef>
-                <a:spcPts val="0"/>
-              </a:spcBef>
-              <a:spcAft>
-                <a:spcPts val="0"/>
-              </a:spcAft>
-              <a:buNone/>
-            </a:pPr>
-            <a:r>
               <a:rPr lang="pt-BR" sz="1000"/>
-              <a:t>Fazer venda de produtos </a:t>
+              <a:t>Fazer venda de produtos fracionado</a:t>
             </a:r>
             <a:endParaRPr sz="800"/>
           </a:p>
@@ -6464,7 +6547,7 @@
       </p:sp>
       <p:cxnSp>
         <p:nvCxnSpPr>
-          <p:cNvPr id="75" name="Google Shape;75;p14"/>
+          <p:cNvPr id="74" name="Google Shape;74;p14"/>
           <p:cNvCxnSpPr/>
           <p:nvPr/>
         </p:nvCxnSpPr>
@@ -6490,7 +6573,7 @@
       </p:cxnSp>
       <p:sp>
         <p:nvSpPr>
-          <p:cNvPr id="76" name="Google Shape;76;p14"/>
+          <p:cNvPr id="75" name="Google Shape;75;p14"/>
           <p:cNvSpPr txBox="1"/>
           <p:nvPr/>
         </p:nvSpPr>
@@ -6543,7 +6626,7 @@
       </p:sp>
       <p:sp>
         <p:nvSpPr>
-          <p:cNvPr id="77" name="Google Shape;77;p14"/>
+          <p:cNvPr id="76" name="Google Shape;76;p14"/>
           <p:cNvSpPr txBox="1"/>
           <p:nvPr/>
         </p:nvSpPr>
@@ -6584,7 +6667,7 @@
       </p:sp>
       <p:cxnSp>
         <p:nvCxnSpPr>
-          <p:cNvPr id="78" name="Google Shape;78;p14"/>
+          <p:cNvPr id="77" name="Google Shape;77;p14"/>
           <p:cNvCxnSpPr/>
           <p:nvPr/>
         </p:nvCxnSpPr>
@@ -6610,7 +6693,7 @@
       </p:cxnSp>
       <p:sp>
         <p:nvSpPr>
-          <p:cNvPr id="79" name="Google Shape;79;p14"/>
+          <p:cNvPr id="78" name="Google Shape;78;p14"/>
           <p:cNvSpPr txBox="1"/>
           <p:nvPr/>
         </p:nvSpPr>
@@ -6663,7 +6746,7 @@
   <p:cSld>
     <p:spTree>
       <p:nvGrpSpPr>
-        <p:cNvPr id="83" name="Shape 83"/>
+        <p:cNvPr id="82" name="Shape 82"/>
         <p:cNvGrpSpPr/>
         <p:nvPr/>
       </p:nvGrpSpPr>
@@ -6677,14 +6760,14 @@
       </p:grpSpPr>
       <p:sp>
         <p:nvSpPr>
-          <p:cNvPr id="84" name="Google Shape;84;p15"/>
+          <p:cNvPr id="83" name="Google Shape;83;p15"/>
           <p:cNvSpPr txBox="1"/>
           <p:nvPr/>
         </p:nvSpPr>
         <p:spPr>
           <a:xfrm>
-            <a:off x="217325" y="271675"/>
-            <a:ext cx="5403000" cy="579600"/>
+            <a:off x="295200" y="158950"/>
+            <a:ext cx="5132100" cy="692700"/>
           </a:xfrm>
           <a:prstGeom prst="rect">
             <a:avLst/>
@@ -6715,7 +6798,7 @@
             </a:r>
             <a:r>
               <a:rPr lang="pt-BR" sz="2200"/>
-              <a:t>Envia relatório nutricional.</a:t>
+              <a:t>Comprar produtos inteiros</a:t>
             </a:r>
             <a:endParaRPr sz="2200"/>
           </a:p>
@@ -6723,7 +6806,7 @@
       </p:sp>
       <p:sp>
         <p:nvSpPr>
-          <p:cNvPr id="85" name="Google Shape;85;p15"/>
+          <p:cNvPr id="84" name="Google Shape;84;p15"/>
           <p:cNvSpPr/>
           <p:nvPr/>
         </p:nvSpPr>
@@ -6772,7 +6855,7 @@
       </p:sp>
       <p:sp>
         <p:nvSpPr>
-          <p:cNvPr id="86" name="Google Shape;86;p15"/>
+          <p:cNvPr id="85" name="Google Shape;85;p15"/>
           <p:cNvSpPr/>
           <p:nvPr/>
         </p:nvSpPr>
@@ -6825,7 +6908,7 @@
       </p:sp>
       <p:sp>
         <p:nvSpPr>
-          <p:cNvPr id="87" name="Google Shape;87;p15"/>
+          <p:cNvPr id="86" name="Google Shape;86;p15"/>
           <p:cNvSpPr txBox="1"/>
           <p:nvPr/>
         </p:nvSpPr>
@@ -6875,7 +6958,626 @@
       </p:sp>
       <p:sp>
         <p:nvSpPr>
+          <p:cNvPr id="87" name="Google Shape;87;p15"/>
+          <p:cNvSpPr/>
+          <p:nvPr/>
+        </p:nvSpPr>
+        <p:spPr>
+          <a:xfrm>
+            <a:off x="6574150" y="1920125"/>
+            <a:ext cx="1743000" cy="538200"/>
+          </a:xfrm>
+          <a:prstGeom prst="cube">
+            <a:avLst>
+              <a:gd fmla="val 25000" name="adj"/>
+            </a:avLst>
+          </a:prstGeom>
+          <a:solidFill>
+            <a:srgbClr val="FFFF00"/>
+          </a:solidFill>
+          <a:ln cap="flat" cmpd="sng" w="9525">
+            <a:solidFill>
+              <a:schemeClr val="dk2"/>
+            </a:solidFill>
+            <a:prstDash val="solid"/>
+            <a:round/>
+            <a:headEnd len="sm" w="sm" type="none"/>
+            <a:tailEnd len="sm" w="sm" type="none"/>
+          </a:ln>
+        </p:spPr>
+        <p:txBody>
+          <a:bodyPr anchorCtr="0" anchor="ctr" bIns="91425" lIns="91425" spcFirstLastPara="1" rIns="91425" wrap="square" tIns="91425">
+            <a:noAutofit/>
+          </a:bodyPr>
+          <a:lstStyle/>
+          <a:p>
+            <a:pPr indent="0" lvl="0" marL="0" rtl="0" algn="l">
+              <a:spcBef>
+                <a:spcPts val="0"/>
+              </a:spcBef>
+              <a:spcAft>
+                <a:spcPts val="0"/>
+              </a:spcAft>
+              <a:buNone/>
+            </a:pPr>
+            <a:r>
+              <a:t/>
+            </a:r>
+            <a:endParaRPr/>
+          </a:p>
+        </p:txBody>
+      </p:sp>
+      <p:cxnSp>
+        <p:nvCxnSpPr>
           <p:cNvPr id="88" name="Google Shape;88;p15"/>
+          <p:cNvCxnSpPr>
+            <a:stCxn id="85" idx="3"/>
+            <a:endCxn id="87" idx="2"/>
+          </p:cNvCxnSpPr>
+          <p:nvPr/>
+        </p:nvCxnSpPr>
+        <p:spPr>
+          <a:xfrm flipH="1" rot="10800000">
+            <a:off x="2021150" y="2256575"/>
+            <a:ext cx="4553100" cy="3000"/>
+          </a:xfrm>
+          <a:prstGeom prst="straightConnector1">
+            <a:avLst/>
+          </a:prstGeom>
+          <a:noFill/>
+          <a:ln cap="flat" cmpd="sng" w="9525">
+            <a:solidFill>
+              <a:schemeClr val="dk2"/>
+            </a:solidFill>
+            <a:prstDash val="solid"/>
+            <a:round/>
+            <a:headEnd len="med" w="med" type="none"/>
+            <a:tailEnd len="med" w="med" type="none"/>
+          </a:ln>
+        </p:spPr>
+      </p:cxnSp>
+      <p:sp>
+        <p:nvSpPr>
+          <p:cNvPr id="89" name="Google Shape;89;p15"/>
+          <p:cNvSpPr/>
+          <p:nvPr/>
+        </p:nvSpPr>
+        <p:spPr>
+          <a:xfrm>
+            <a:off x="6836950" y="2770975"/>
+            <a:ext cx="996000" cy="692700"/>
+          </a:xfrm>
+          <a:prstGeom prst="rect">
+            <a:avLst/>
+          </a:prstGeom>
+          <a:solidFill>
+            <a:srgbClr val="FFD966"/>
+          </a:solidFill>
+          <a:ln cap="flat" cmpd="sng" w="9525">
+            <a:solidFill>
+              <a:schemeClr val="dk2"/>
+            </a:solidFill>
+            <a:prstDash val="solid"/>
+            <a:round/>
+            <a:headEnd len="sm" w="sm" type="none"/>
+            <a:tailEnd len="sm" w="sm" type="none"/>
+          </a:ln>
+        </p:spPr>
+        <p:txBody>
+          <a:bodyPr anchorCtr="0" anchor="ctr" bIns="91425" lIns="91425" spcFirstLastPara="1" rIns="91425" wrap="square" tIns="91425">
+            <a:noAutofit/>
+          </a:bodyPr>
+          <a:lstStyle/>
+          <a:p>
+            <a:pPr indent="0" lvl="0" marL="0" rtl="0" algn="l">
+              <a:spcBef>
+                <a:spcPts val="0"/>
+              </a:spcBef>
+              <a:spcAft>
+                <a:spcPts val="0"/>
+              </a:spcAft>
+              <a:buNone/>
+            </a:pPr>
+            <a:r>
+              <a:t/>
+            </a:r>
+            <a:endParaRPr/>
+          </a:p>
+        </p:txBody>
+      </p:sp>
+      <p:sp>
+        <p:nvSpPr>
+          <p:cNvPr id="90" name="Google Shape;90;p15"/>
+          <p:cNvSpPr txBox="1"/>
+          <p:nvPr/>
+        </p:nvSpPr>
+        <p:spPr>
+          <a:xfrm>
+            <a:off x="7588475" y="3024525"/>
+            <a:ext cx="7345800" cy="857100"/>
+          </a:xfrm>
+          <a:prstGeom prst="rect">
+            <a:avLst/>
+          </a:prstGeom>
+          <a:noFill/>
+          <a:ln>
+            <a:noFill/>
+          </a:ln>
+        </p:spPr>
+        <p:txBody>
+          <a:bodyPr anchorCtr="0" anchor="t" bIns="91425" lIns="91425" spcFirstLastPara="1" rIns="91425" wrap="square" tIns="91425">
+            <a:noAutofit/>
+          </a:bodyPr>
+          <a:lstStyle/>
+          <a:p>
+            <a:pPr indent="0" lvl="0" marL="0" rtl="0" algn="l">
+              <a:spcBef>
+                <a:spcPts val="0"/>
+              </a:spcBef>
+              <a:spcAft>
+                <a:spcPts val="0"/>
+              </a:spcAft>
+              <a:buNone/>
+            </a:pPr>
+            <a:r>
+              <a:t/>
+            </a:r>
+            <a:endParaRPr/>
+          </a:p>
+        </p:txBody>
+      </p:sp>
+      <p:sp>
+        <p:nvSpPr>
+          <p:cNvPr id="91" name="Google Shape;91;p15"/>
+          <p:cNvSpPr txBox="1"/>
+          <p:nvPr/>
+        </p:nvSpPr>
+        <p:spPr>
+          <a:xfrm>
+            <a:off x="6904750" y="2803200"/>
+            <a:ext cx="928200" cy="538200"/>
+          </a:xfrm>
+          <a:prstGeom prst="rect">
+            <a:avLst/>
+          </a:prstGeom>
+          <a:noFill/>
+          <a:ln>
+            <a:noFill/>
+          </a:ln>
+        </p:spPr>
+        <p:txBody>
+          <a:bodyPr anchorCtr="0" anchor="t" bIns="91425" lIns="91425" spcFirstLastPara="1" rIns="91425" wrap="square" tIns="91425">
+            <a:noAutofit/>
+          </a:bodyPr>
+          <a:lstStyle/>
+          <a:p>
+            <a:pPr indent="0" lvl="0" marL="0" rtl="0" algn="l">
+              <a:spcBef>
+                <a:spcPts val="0"/>
+              </a:spcBef>
+              <a:spcAft>
+                <a:spcPts val="0"/>
+              </a:spcAft>
+              <a:buNone/>
+            </a:pPr>
+            <a:r>
+              <a:rPr lang="pt-BR" sz="1000"/>
+              <a:t>Fazer venda de produtos inteiro</a:t>
+            </a:r>
+            <a:endParaRPr sz="800"/>
+          </a:p>
+        </p:txBody>
+      </p:sp>
+      <p:cxnSp>
+        <p:nvCxnSpPr>
+          <p:cNvPr id="92" name="Google Shape;92;p15"/>
+          <p:cNvCxnSpPr/>
+          <p:nvPr/>
+        </p:nvCxnSpPr>
+        <p:spPr>
+          <a:xfrm>
+            <a:off x="7588475" y="3024525"/>
+            <a:ext cx="0" cy="0"/>
+          </a:xfrm>
+          <a:prstGeom prst="straightConnector1">
+            <a:avLst/>
+          </a:prstGeom>
+          <a:noFill/>
+          <a:ln cap="flat" cmpd="sng" w="9525">
+            <a:solidFill>
+              <a:schemeClr val="dk2"/>
+            </a:solidFill>
+            <a:prstDash val="solid"/>
+            <a:round/>
+            <a:headEnd len="med" w="med" type="none"/>
+            <a:tailEnd len="med" w="med" type="none"/>
+          </a:ln>
+        </p:spPr>
+      </p:cxnSp>
+      <p:sp>
+        <p:nvSpPr>
+          <p:cNvPr id="93" name="Google Shape;93;p15"/>
+          <p:cNvSpPr txBox="1"/>
+          <p:nvPr/>
+        </p:nvSpPr>
+        <p:spPr>
+          <a:xfrm>
+            <a:off x="6507500" y="1971888"/>
+            <a:ext cx="1541400" cy="454200"/>
+          </a:xfrm>
+          <a:prstGeom prst="rect">
+            <a:avLst/>
+          </a:prstGeom>
+          <a:noFill/>
+          <a:ln>
+            <a:noFill/>
+          </a:ln>
+        </p:spPr>
+        <p:txBody>
+          <a:bodyPr anchorCtr="0" anchor="t" bIns="91425" lIns="91425" spcFirstLastPara="1" rIns="91425" wrap="square" tIns="91425">
+            <a:noAutofit/>
+          </a:bodyPr>
+          <a:lstStyle/>
+          <a:p>
+            <a:pPr indent="0" lvl="0" marL="0" rtl="0" algn="l">
+              <a:spcBef>
+                <a:spcPts val="0"/>
+              </a:spcBef>
+              <a:spcAft>
+                <a:spcPts val="0"/>
+              </a:spcAft>
+              <a:buNone/>
+            </a:pPr>
+            <a:r>
+              <a:rPr lang="pt-BR" sz="1200"/>
+              <a:t>Consultor  Herbalife</a:t>
+            </a:r>
+            <a:br>
+              <a:rPr lang="pt-BR" sz="1200"/>
+            </a:br>
+            <a:r>
+              <a:rPr lang="pt-BR" sz="1200"/>
+              <a:t>(Nó operacional)</a:t>
+            </a:r>
+            <a:endParaRPr sz="1200"/>
+          </a:p>
+        </p:txBody>
+      </p:sp>
+      <p:sp>
+        <p:nvSpPr>
+          <p:cNvPr id="94" name="Google Shape;94;p15"/>
+          <p:cNvSpPr txBox="1"/>
+          <p:nvPr/>
+        </p:nvSpPr>
+        <p:spPr>
+          <a:xfrm>
+            <a:off x="2100875" y="3151300"/>
+            <a:ext cx="1140900" cy="253500"/>
+          </a:xfrm>
+          <a:prstGeom prst="rect">
+            <a:avLst/>
+          </a:prstGeom>
+          <a:noFill/>
+          <a:ln>
+            <a:noFill/>
+          </a:ln>
+        </p:spPr>
+        <p:txBody>
+          <a:bodyPr anchorCtr="0" anchor="t" bIns="91425" lIns="91425" spcFirstLastPara="1" rIns="91425" wrap="square" tIns="91425">
+            <a:noAutofit/>
+          </a:bodyPr>
+          <a:lstStyle/>
+          <a:p>
+            <a:pPr indent="0" lvl="0" marL="0" rtl="0" algn="l">
+              <a:spcBef>
+                <a:spcPts val="0"/>
+              </a:spcBef>
+              <a:spcAft>
+                <a:spcPts val="0"/>
+              </a:spcAft>
+              <a:buNone/>
+            </a:pPr>
+            <a:r>
+              <a:t/>
+            </a:r>
+            <a:endParaRPr/>
+          </a:p>
+        </p:txBody>
+      </p:sp>
+      <p:cxnSp>
+        <p:nvCxnSpPr>
+          <p:cNvPr id="95" name="Google Shape;95;p15"/>
+          <p:cNvCxnSpPr/>
+          <p:nvPr/>
+        </p:nvCxnSpPr>
+        <p:spPr>
+          <a:xfrm>
+            <a:off x="7445650" y="2461950"/>
+            <a:ext cx="0" cy="305400"/>
+          </a:xfrm>
+          <a:prstGeom prst="straightConnector1">
+            <a:avLst/>
+          </a:prstGeom>
+          <a:noFill/>
+          <a:ln cap="flat" cmpd="sng" w="9525">
+            <a:solidFill>
+              <a:schemeClr val="dk2"/>
+            </a:solidFill>
+            <a:prstDash val="solid"/>
+            <a:round/>
+            <a:headEnd len="med" w="med" type="none"/>
+            <a:tailEnd len="med" w="med" type="none"/>
+          </a:ln>
+        </p:spPr>
+      </p:cxnSp>
+      <p:sp>
+        <p:nvSpPr>
+          <p:cNvPr id="96" name="Google Shape;96;p15"/>
+          <p:cNvSpPr txBox="1"/>
+          <p:nvPr/>
+        </p:nvSpPr>
+        <p:spPr>
+          <a:xfrm>
+            <a:off x="6444450" y="1532825"/>
+            <a:ext cx="1969200" cy="403200"/>
+          </a:xfrm>
+          <a:prstGeom prst="rect">
+            <a:avLst/>
+          </a:prstGeom>
+          <a:noFill/>
+          <a:ln>
+            <a:noFill/>
+          </a:ln>
+        </p:spPr>
+        <p:txBody>
+          <a:bodyPr anchorCtr="0" anchor="t" bIns="91425" lIns="91425" spcFirstLastPara="1" rIns="91425" wrap="square" tIns="91425">
+            <a:noAutofit/>
+          </a:bodyPr>
+          <a:lstStyle/>
+          <a:p>
+            <a:pPr indent="0" lvl="0" marL="0" rtl="0" algn="l">
+              <a:spcBef>
+                <a:spcPts val="0"/>
+              </a:spcBef>
+              <a:spcAft>
+                <a:spcPts val="0"/>
+              </a:spcAft>
+              <a:buNone/>
+            </a:pPr>
+            <a:r>
+              <a:rPr lang="pt-BR" sz="1100"/>
+              <a:t>EVS ADEMIR E BARBARA</a:t>
+            </a:r>
+            <a:endParaRPr sz="1100"/>
+          </a:p>
+        </p:txBody>
+      </p:sp>
+    </p:spTree>
+  </p:cSld>
+  <p:clrMapOvr>
+    <a:masterClrMapping/>
+  </p:clrMapOvr>
+</p:sld>
+</file>
+
+<file path=ppt/slides/slide4.xml><?xml version="1.0" encoding="utf-8"?>
+<p:sld xmlns:a="http://schemas.openxmlformats.org/drawingml/2006/main" xmlns:r="http://schemas.openxmlformats.org/officeDocument/2006/relationships" xmlns:mc="http://schemas.openxmlformats.org/markup-compatibility/2006" xmlns:mv="urn:schemas-microsoft-com:mac:vml" xmlns:p="http://schemas.openxmlformats.org/presentationml/2006/main" xmlns:c="http://schemas.openxmlformats.org/drawingml/2006/chart" xmlns:dgm="http://schemas.openxmlformats.org/drawingml/2006/diagram" xmlns:o="urn:schemas-microsoft-com:office:office" xmlns:v="urn:schemas-microsoft-com:vml" xmlns:pvml="urn:schemas-microsoft-com:office:powerpoint" xmlns:com="http://schemas.openxmlformats.org/drawingml/2006/compatibility" xmlns:p14="http://schemas.microsoft.com/office/powerpoint/2010/main" xmlns:p15="http://schemas.microsoft.com/office/powerpoint/2012/main" xmlns:ahyp="http://schemas.microsoft.com/office/drawing/2018/hyperlinkcolor">
+  <p:cSld>
+    <p:spTree>
+      <p:nvGrpSpPr>
+        <p:cNvPr id="100" name="Shape 100"/>
+        <p:cNvGrpSpPr/>
+        <p:nvPr/>
+      </p:nvGrpSpPr>
+      <p:grpSpPr>
+        <a:xfrm>
+          <a:off x="0" y="0"/>
+          <a:ext cx="0" cy="0"/>
+          <a:chOff x="0" y="0"/>
+          <a:chExt cx="0" cy="0"/>
+        </a:xfrm>
+      </p:grpSpPr>
+      <p:sp>
+        <p:nvSpPr>
+          <p:cNvPr id="101" name="Google Shape;101;p16"/>
+          <p:cNvSpPr txBox="1"/>
+          <p:nvPr/>
+        </p:nvSpPr>
+        <p:spPr>
+          <a:xfrm>
+            <a:off x="217325" y="271675"/>
+            <a:ext cx="5403000" cy="579600"/>
+          </a:xfrm>
+          <a:prstGeom prst="rect">
+            <a:avLst/>
+          </a:prstGeom>
+          <a:noFill/>
+          <a:ln>
+            <a:noFill/>
+          </a:ln>
+        </p:spPr>
+        <p:txBody>
+          <a:bodyPr anchorCtr="0" anchor="t" bIns="91425" lIns="91425" spcFirstLastPara="1" rIns="91425" wrap="square" tIns="91425">
+            <a:noAutofit/>
+          </a:bodyPr>
+          <a:lstStyle/>
+          <a:p>
+            <a:pPr indent="0" lvl="0" marL="0" rtl="0" algn="l">
+              <a:spcBef>
+                <a:spcPts val="0"/>
+              </a:spcBef>
+              <a:spcAft>
+                <a:spcPts val="0"/>
+              </a:spcAft>
+              <a:buNone/>
+            </a:pPr>
+            <a:r>
+              <a:rPr lang="pt-BR" sz="2900"/>
+              <a:t>Cenário:</a:t>
+            </a:r>
+            <a:r>
+              <a:rPr lang="pt-BR" sz="2200"/>
+              <a:t>Enviar relatório nutricional.</a:t>
+            </a:r>
+            <a:endParaRPr sz="2200"/>
+          </a:p>
+        </p:txBody>
+      </p:sp>
+      <p:sp>
+        <p:nvSpPr>
+          <p:cNvPr id="102" name="Google Shape;102;p16"/>
+          <p:cNvSpPr/>
+          <p:nvPr/>
+        </p:nvSpPr>
+        <p:spPr>
+          <a:xfrm>
+            <a:off x="6097300" y="1510050"/>
+            <a:ext cx="2475300" cy="2123400"/>
+          </a:xfrm>
+          <a:prstGeom prst="roundRect">
+            <a:avLst>
+              <a:gd fmla="val 16667" name="adj"/>
+            </a:avLst>
+          </a:prstGeom>
+          <a:noFill/>
+          <a:ln cap="flat" cmpd="sng" w="9525">
+            <a:solidFill>
+              <a:srgbClr val="0000FF"/>
+            </a:solidFill>
+            <a:prstDash val="solid"/>
+            <a:round/>
+            <a:headEnd len="sm" w="sm" type="none"/>
+            <a:tailEnd len="sm" w="sm" type="none"/>
+          </a:ln>
+        </p:spPr>
+        <p:txBody>
+          <a:bodyPr anchorCtr="0" anchor="ctr" bIns="91425" lIns="91425" spcFirstLastPara="1" rIns="91425" wrap="square" tIns="91425">
+            <a:noAutofit/>
+          </a:bodyPr>
+          <a:lstStyle/>
+          <a:p>
+            <a:pPr indent="0" lvl="0" marL="0" rtl="0" algn="l">
+              <a:spcBef>
+                <a:spcPts val="0"/>
+              </a:spcBef>
+              <a:spcAft>
+                <a:spcPts val="0"/>
+              </a:spcAft>
+              <a:buNone/>
+            </a:pPr>
+            <a:r>
+              <a:t/>
+            </a:r>
+            <a:endParaRPr/>
+          </a:p>
+        </p:txBody>
+      </p:sp>
+      <p:sp>
+        <p:nvSpPr>
+          <p:cNvPr id="103" name="Google Shape;103;p16"/>
+          <p:cNvSpPr/>
+          <p:nvPr/>
+        </p:nvSpPr>
+        <p:spPr>
+          <a:xfrm>
+            <a:off x="874250" y="1862225"/>
+            <a:ext cx="1146900" cy="794700"/>
+          </a:xfrm>
+          <a:prstGeom prst="rect">
+            <a:avLst/>
+          </a:prstGeom>
+          <a:solidFill>
+            <a:srgbClr val="5A5AD2"/>
+          </a:solidFill>
+          <a:ln cap="flat" cmpd="sng" w="9525">
+            <a:solidFill>
+              <a:srgbClr val="0000FF"/>
+            </a:solidFill>
+            <a:prstDash val="solid"/>
+            <a:round/>
+            <a:headEnd len="sm" w="sm" type="none"/>
+            <a:tailEnd len="sm" w="sm" type="none"/>
+          </a:ln>
+        </p:spPr>
+        <p:txBody>
+          <a:bodyPr anchorCtr="0" anchor="ctr" bIns="91425" lIns="91425" spcFirstLastPara="1" rIns="91425" wrap="square" tIns="91425">
+            <a:noAutofit/>
+          </a:bodyPr>
+          <a:lstStyle/>
+          <a:p>
+            <a:pPr indent="0" lvl="0" marL="0" rtl="0" algn="l">
+              <a:spcBef>
+                <a:spcPts val="0"/>
+              </a:spcBef>
+              <a:spcAft>
+                <a:spcPts val="0"/>
+              </a:spcAft>
+              <a:buNone/>
+            </a:pPr>
+            <a:r>
+              <a:t/>
+            </a:r>
+            <a:endParaRPr>
+              <a:solidFill>
+                <a:srgbClr val="0000FF"/>
+              </a:solidFill>
+            </a:endParaRPr>
+          </a:p>
+        </p:txBody>
+      </p:sp>
+      <p:sp>
+        <p:nvSpPr>
+          <p:cNvPr id="104" name="Google Shape;104;p16"/>
+          <p:cNvSpPr txBox="1"/>
+          <p:nvPr/>
+        </p:nvSpPr>
+        <p:spPr>
+          <a:xfrm>
+            <a:off x="1056050" y="2026925"/>
+            <a:ext cx="783300" cy="204300"/>
+          </a:xfrm>
+          <a:prstGeom prst="rect">
+            <a:avLst/>
+          </a:prstGeom>
+          <a:noFill/>
+          <a:ln>
+            <a:noFill/>
+          </a:ln>
+        </p:spPr>
+        <p:txBody>
+          <a:bodyPr anchorCtr="0" anchor="t" bIns="91425" lIns="91425" spcFirstLastPara="1" rIns="91425" wrap="square" tIns="91425">
+            <a:noAutofit/>
+          </a:bodyPr>
+          <a:lstStyle/>
+          <a:p>
+            <a:pPr indent="0" lvl="0" marL="0" rtl="0" algn="l">
+              <a:spcBef>
+                <a:spcPts val="0"/>
+              </a:spcBef>
+              <a:spcAft>
+                <a:spcPts val="0"/>
+              </a:spcAft>
+              <a:buNone/>
+            </a:pPr>
+            <a:r>
+              <a:rPr lang="pt-BR">
+                <a:solidFill>
+                  <a:srgbClr val="FFFFFF"/>
+                </a:solidFill>
+              </a:rPr>
+              <a:t>Cliente</a:t>
+            </a:r>
+            <a:endParaRPr>
+              <a:solidFill>
+                <a:srgbClr val="FFFFFF"/>
+              </a:solidFill>
+            </a:endParaRPr>
+          </a:p>
+        </p:txBody>
+      </p:sp>
+      <p:sp>
+        <p:nvSpPr>
+          <p:cNvPr id="105" name="Google Shape;105;p16"/>
           <p:cNvSpPr/>
           <p:nvPr/>
         </p:nvSpPr>
@@ -6934,10 +7636,10 @@
       </p:sp>
       <p:cxnSp>
         <p:nvCxnSpPr>
-          <p:cNvPr id="89" name="Google Shape;89;p15"/>
+          <p:cNvPr id="106" name="Google Shape;106;p16"/>
           <p:cNvCxnSpPr>
-            <a:stCxn id="86" idx="3"/>
-            <a:endCxn id="88" idx="2"/>
+            <a:stCxn id="103" idx="3"/>
+            <a:endCxn id="105" idx="2"/>
           </p:cNvCxnSpPr>
           <p:nvPr/>
         </p:nvCxnSpPr>
@@ -6963,7 +7665,7 @@
       </p:cxnSp>
       <p:sp>
         <p:nvSpPr>
-          <p:cNvPr id="90" name="Google Shape;90;p15"/>
+          <p:cNvPr id="107" name="Google Shape;107;p16"/>
           <p:cNvSpPr/>
           <p:nvPr/>
         </p:nvSpPr>
@@ -7012,7 +7714,7 @@
       </p:sp>
       <p:cxnSp>
         <p:nvCxnSpPr>
-          <p:cNvPr id="91" name="Google Shape;91;p15"/>
+          <p:cNvPr id="108" name="Google Shape;108;p16"/>
           <p:cNvCxnSpPr/>
           <p:nvPr/>
         </p:nvCxnSpPr>
@@ -7038,7 +7740,7 @@
       </p:cxnSp>
       <p:sp>
         <p:nvSpPr>
-          <p:cNvPr id="92" name="Google Shape;92;p15"/>
+          <p:cNvPr id="109" name="Google Shape;109;p16"/>
           <p:cNvSpPr txBox="1"/>
           <p:nvPr/>
         </p:nvSpPr>
@@ -7079,7 +7781,7 @@
       </p:sp>
       <p:sp>
         <p:nvSpPr>
-          <p:cNvPr id="93" name="Google Shape;93;p15"/>
+          <p:cNvPr id="110" name="Google Shape;110;p16"/>
           <p:cNvSpPr txBox="1"/>
           <p:nvPr/>
         </p:nvSpPr>
@@ -7120,7 +7822,7 @@
       </p:sp>
       <p:sp>
         <p:nvSpPr>
-          <p:cNvPr id="94" name="Google Shape;94;p15"/>
+          <p:cNvPr id="111" name="Google Shape;111;p16"/>
           <p:cNvSpPr txBox="1"/>
           <p:nvPr/>
         </p:nvSpPr>
@@ -7162,7 +7864,7 @@
       </p:sp>
       <p:cxnSp>
         <p:nvCxnSpPr>
-          <p:cNvPr id="95" name="Google Shape;95;p15"/>
+          <p:cNvPr id="112" name="Google Shape;112;p16"/>
           <p:cNvCxnSpPr/>
           <p:nvPr/>
         </p:nvCxnSpPr>
@@ -7188,7 +7890,7 @@
       </p:cxnSp>
       <p:sp>
         <p:nvSpPr>
-          <p:cNvPr id="96" name="Google Shape;96;p15"/>
+          <p:cNvPr id="113" name="Google Shape;113;p16"/>
           <p:cNvSpPr txBox="1"/>
           <p:nvPr/>
         </p:nvSpPr>
@@ -7237,6 +7939,285 @@
 </file>
 
 <file path=ppt/theme/theme1.xml><?xml version="1.0" encoding="utf-8"?>
+<a:theme xmlns:a="http://schemas.openxmlformats.org/drawingml/2006/main" xmlns:r="http://schemas.openxmlformats.org/officeDocument/2006/relationships">
+  <a:themeElements>
+    <a:clrScheme name="Default">
+      <a:dk1>
+        <a:srgbClr val="000000"/>
+      </a:dk1>
+      <a:lt1>
+        <a:srgbClr val="FFFFFF"/>
+      </a:lt1>
+      <a:dk2>
+        <a:srgbClr val="158158"/>
+      </a:dk2>
+      <a:lt2>
+        <a:srgbClr val="F3F3F3"/>
+      </a:lt2>
+      <a:accent1>
+        <a:srgbClr val="058DC7"/>
+      </a:accent1>
+      <a:accent2>
+        <a:srgbClr val="50B432"/>
+      </a:accent2>
+      <a:accent3>
+        <a:srgbClr val="ED561B"/>
+      </a:accent3>
+      <a:accent4>
+        <a:srgbClr val="EDEF00"/>
+      </a:accent4>
+      <a:accent5>
+        <a:srgbClr val="24CBE5"/>
+      </a:accent5>
+      <a:accent6>
+        <a:srgbClr val="64E572"/>
+      </a:accent6>
+      <a:hlink>
+        <a:srgbClr val="2200CC"/>
+      </a:hlink>
+      <a:folHlink>
+        <a:srgbClr val="551A8B"/>
+      </a:folHlink>
+    </a:clrScheme>
+    <a:fontScheme name="Office">
+      <a:majorFont>
+        <a:latin typeface="Arial"/>
+        <a:ea typeface=""/>
+        <a:cs typeface=""/>
+        <a:font script="Jpan" typeface="ＭＳ Ｐゴシック"/>
+        <a:font script="Hang" typeface="맑은 고딕"/>
+        <a:font script="Hans" typeface="宋体"/>
+        <a:font script="Hant" typeface="新細明體"/>
+        <a:font script="Arab" typeface="Times New Roman"/>
+        <a:font script="Hebr" typeface="Times New Roman"/>
+        <a:font script="Thai" typeface="Angsana New"/>
+        <a:font script="Ethi" typeface="Nyala"/>
+        <a:font script="Beng" typeface="Vrinda"/>
+        <a:font script="Gujr" typeface="Shruti"/>
+        <a:font script="Khmr" typeface="MoolBoran"/>
+        <a:font script="Knda" typeface="Tunga"/>
+        <a:font script="Guru" typeface="Raavi"/>
+        <a:font script="Cans" typeface="Euphemia"/>
+        <a:font script="Cher" typeface="Plantagenet Cherokee"/>
+        <a:font script="Yiii" typeface="Microsoft Yi Baiti"/>
+        <a:font script="Tibt" typeface="Microsoft Himalaya"/>
+        <a:font script="Thaa" typeface="MV Boli"/>
+        <a:font script="Deva" typeface="Mangal"/>
+        <a:font script="Telu" typeface="Gautami"/>
+        <a:font script="Taml" typeface="Latha"/>
+        <a:font script="Syrc" typeface="Estrangelo Edessa"/>
+        <a:font script="Orya" typeface="Kalinga"/>
+        <a:font script="Mlym" typeface="Kartika"/>
+        <a:font script="Laoo" typeface="DokChampa"/>
+        <a:font script="Sinh" typeface="Iskoola Pota"/>
+        <a:font script="Mong" typeface="Mongolian Baiti"/>
+        <a:font script="Viet" typeface="Times New Roman"/>
+        <a:font script="Uigh" typeface="Microsoft Uighur"/>
+        <a:font script="Geor" typeface="Sylfaen"/>
+      </a:majorFont>
+      <a:minorFont>
+        <a:latin typeface="Arial"/>
+        <a:ea typeface=""/>
+        <a:cs typeface=""/>
+        <a:font script="Jpan" typeface="ＭＳ Ｐゴシック"/>
+        <a:font script="Hang" typeface="맑은 고딕"/>
+        <a:font script="Hans" typeface="宋体"/>
+        <a:font script="Hant" typeface="新細明體"/>
+        <a:font script="Arab" typeface="Arial"/>
+        <a:font script="Hebr" typeface="Arial"/>
+        <a:font script="Thai" typeface="Cordia New"/>
+        <a:font script="Ethi" typeface="Nyala"/>
+        <a:font script="Beng" typeface="Vrinda"/>
+        <a:font script="Gujr" typeface="Shruti"/>
+        <a:font script="Khmr" typeface="DaunPenh"/>
+        <a:font script="Knda" typeface="Tunga"/>
+        <a:font script="Guru" typeface="Raavi"/>
+        <a:font script="Cans" typeface="Euphemia"/>
+        <a:font script="Cher" typeface="Plantagenet Cherokee"/>
+        <a:font script="Yiii" typeface="Microsoft Yi Baiti"/>
+        <a:font script="Tibt" typeface="Microsoft Himalaya"/>
+        <a:font script="Thaa" typeface="MV Boli"/>
+        <a:font script="Deva" typeface="Mangal"/>
+        <a:font script="Telu" typeface="Gautami"/>
+        <a:font script="Taml" typeface="Latha"/>
+        <a:font script="Syrc" typeface="Estrangelo Edessa"/>
+        <a:font script="Orya" typeface="Kalinga"/>
+        <a:font script="Mlym" typeface="Kartika"/>
+        <a:font script="Laoo" typeface="DokChampa"/>
+        <a:font script="Sinh" typeface="Iskoola Pota"/>
+        <a:font script="Mong" typeface="Mongolian Baiti"/>
+        <a:font script="Viet" typeface="Arial"/>
+        <a:font script="Uigh" typeface="Microsoft Uighur"/>
+        <a:font script="Geor" typeface="Sylfaen"/>
+      </a:minorFont>
+    </a:fontScheme>
+    <a:fmtScheme name="Office">
+      <a:fillStyleLst>
+        <a:solidFill>
+          <a:schemeClr val="phClr"/>
+        </a:solidFill>
+        <a:gradFill rotWithShape="1">
+          <a:gsLst>
+            <a:gs pos="0">
+              <a:schemeClr val="phClr">
+                <a:tint val="50000"/>
+                <a:satMod val="300000"/>
+              </a:schemeClr>
+            </a:gs>
+            <a:gs pos="35000">
+              <a:schemeClr val="phClr">
+                <a:tint val="37000"/>
+                <a:satMod val="300000"/>
+              </a:schemeClr>
+            </a:gs>
+            <a:gs pos="100000">
+              <a:schemeClr val="phClr">
+                <a:tint val="15000"/>
+                <a:satMod val="350000"/>
+              </a:schemeClr>
+            </a:gs>
+          </a:gsLst>
+          <a:lin ang="16200000" scaled="1"/>
+        </a:gradFill>
+        <a:gradFill rotWithShape="1">
+          <a:gsLst>
+            <a:gs pos="0">
+              <a:schemeClr val="phClr">
+                <a:tint val="100000"/>
+                <a:shade val="100000"/>
+                <a:satMod val="130000"/>
+              </a:schemeClr>
+            </a:gs>
+            <a:gs pos="100000">
+              <a:schemeClr val="phClr">
+                <a:tint val="50000"/>
+                <a:shade val="100000"/>
+                <a:satMod val="350000"/>
+              </a:schemeClr>
+            </a:gs>
+          </a:gsLst>
+          <a:lin ang="16200000" scaled="0"/>
+        </a:gradFill>
+      </a:fillStyleLst>
+      <a:lnStyleLst>
+        <a:ln w="9525" cap="flat" cmpd="sng" algn="ctr">
+          <a:solidFill>
+            <a:schemeClr val="phClr">
+              <a:shade val="95000"/>
+              <a:satMod val="105000"/>
+            </a:schemeClr>
+          </a:solidFill>
+          <a:prstDash val="solid"/>
+        </a:ln>
+        <a:ln w="25400" cap="flat" cmpd="sng" algn="ctr">
+          <a:solidFill>
+            <a:schemeClr val="phClr"/>
+          </a:solidFill>
+          <a:prstDash val="solid"/>
+        </a:ln>
+        <a:ln w="38100" cap="flat" cmpd="sng" algn="ctr">
+          <a:solidFill>
+            <a:schemeClr val="phClr"/>
+          </a:solidFill>
+          <a:prstDash val="solid"/>
+        </a:ln>
+      </a:lnStyleLst>
+      <a:effectStyleLst>
+        <a:effectStyle>
+          <a:effectLst>
+            <a:outerShdw blurRad="40000" dist="20000" dir="5400000" rotWithShape="0">
+              <a:srgbClr val="000000">
+                <a:alpha val="38000"/>
+              </a:srgbClr>
+            </a:outerShdw>
+          </a:effectLst>
+        </a:effectStyle>
+        <a:effectStyle>
+          <a:effectLst>
+            <a:outerShdw blurRad="40000" dist="23000" dir="5400000" rotWithShape="0">
+              <a:srgbClr val="000000">
+                <a:alpha val="35000"/>
+              </a:srgbClr>
+            </a:outerShdw>
+          </a:effectLst>
+        </a:effectStyle>
+        <a:effectStyle>
+          <a:effectLst>
+            <a:outerShdw blurRad="40000" dist="23000" dir="5400000" rotWithShape="0">
+              <a:srgbClr val="000000">
+                <a:alpha val="35000"/>
+              </a:srgbClr>
+            </a:outerShdw>
+          </a:effectLst>
+          <a:scene3d>
+            <a:camera prst="orthographicFront">
+              <a:rot lat="0" lon="0" rev="0"/>
+            </a:camera>
+            <a:lightRig rig="threePt" dir="t">
+              <a:rot lat="0" lon="0" rev="1200000"/>
+            </a:lightRig>
+          </a:scene3d>
+          <a:sp3d>
+            <a:bevelT w="63500" h="25400"/>
+          </a:sp3d>
+        </a:effectStyle>
+      </a:effectStyleLst>
+      <a:bgFillStyleLst>
+        <a:solidFill>
+          <a:schemeClr val="phClr"/>
+        </a:solidFill>
+        <a:gradFill rotWithShape="1">
+          <a:gsLst>
+            <a:gs pos="0">
+              <a:schemeClr val="phClr">
+                <a:tint val="40000"/>
+                <a:satMod val="350000"/>
+              </a:schemeClr>
+            </a:gs>
+            <a:gs pos="40000">
+              <a:schemeClr val="phClr">
+                <a:tint val="45000"/>
+                <a:shade val="99000"/>
+                <a:satMod val="350000"/>
+              </a:schemeClr>
+            </a:gs>
+            <a:gs pos="100000">
+              <a:schemeClr val="phClr">
+                <a:shade val="20000"/>
+                <a:satMod val="255000"/>
+              </a:schemeClr>
+            </a:gs>
+          </a:gsLst>
+          <a:path path="circle">
+            <a:fillToRect l="50000" t="-80000" r="50000" b="180000"/>
+          </a:path>
+        </a:gradFill>
+        <a:gradFill rotWithShape="1">
+          <a:gsLst>
+            <a:gs pos="0">
+              <a:schemeClr val="phClr">
+                <a:tint val="80000"/>
+                <a:satMod val="300000"/>
+              </a:schemeClr>
+            </a:gs>
+            <a:gs pos="100000">
+              <a:schemeClr val="phClr">
+                <a:shade val="30000"/>
+                <a:satMod val="200000"/>
+              </a:schemeClr>
+            </a:gs>
+          </a:gsLst>
+          <a:path path="circle">
+            <a:fillToRect l="50000" t="50000" r="50000" b="50000"/>
+          </a:path>
+        </a:gradFill>
+      </a:bgFillStyleLst>
+    </a:fmtScheme>
+  </a:themeElements>
+</a:theme>
+</file>
+
+<file path=ppt/theme/theme2.xml><?xml version="1.0" encoding="utf-8"?>
 <a:theme xmlns:a="http://schemas.openxmlformats.org/drawingml/2006/main" xmlns:r="http://schemas.openxmlformats.org/officeDocument/2006/relationships" name="Simple Light">
   <a:themeElements>
     <a:clrScheme name="Simple Light">
@@ -7513,283 +8494,4 @@
     </a:fmtScheme>
   </a:themeElements>
 </a:theme>
-</file>
-
-<file path=ppt/theme/theme2.xml><?xml version="1.0" encoding="utf-8"?>
-<a:theme xmlns:a="http://schemas.openxmlformats.org/drawingml/2006/main" xmlns:r="http://schemas.openxmlformats.org/officeDocument/2006/relationships">
-  <a:themeElements>
-    <a:clrScheme name="Default">
-      <a:dk1>
-        <a:srgbClr val="000000"/>
-      </a:dk1>
-      <a:lt1>
-        <a:srgbClr val="FFFFFF"/>
-      </a:lt1>
-      <a:dk2>
-        <a:srgbClr val="158158"/>
-      </a:dk2>
-      <a:lt2>
-        <a:srgbClr val="F3F3F3"/>
-      </a:lt2>
-      <a:accent1>
-        <a:srgbClr val="058DC7"/>
-      </a:accent1>
-      <a:accent2>
-        <a:srgbClr val="50B432"/>
-      </a:accent2>
-      <a:accent3>
-        <a:srgbClr val="ED561B"/>
-      </a:accent3>
-      <a:accent4>
-        <a:srgbClr val="EDEF00"/>
-      </a:accent4>
-      <a:accent5>
-        <a:srgbClr val="24CBE5"/>
-      </a:accent5>
-      <a:accent6>
-        <a:srgbClr val="64E572"/>
-      </a:accent6>
-      <a:hlink>
-        <a:srgbClr val="2200CC"/>
-      </a:hlink>
-      <a:folHlink>
-        <a:srgbClr val="551A8B"/>
-      </a:folHlink>
-    </a:clrScheme>
-    <a:fontScheme name="Office">
-      <a:majorFont>
-        <a:latin typeface="Arial"/>
-        <a:ea typeface=""/>
-        <a:cs typeface=""/>
-        <a:font script="Jpan" typeface="ＭＳ Ｐゴシック"/>
-        <a:font script="Hang" typeface="맑은 고딕"/>
-        <a:font script="Hans" typeface="宋体"/>
-        <a:font script="Hant" typeface="新細明體"/>
-        <a:font script="Arab" typeface="Times New Roman"/>
-        <a:font script="Hebr" typeface="Times New Roman"/>
-        <a:font script="Thai" typeface="Angsana New"/>
-        <a:font script="Ethi" typeface="Nyala"/>
-        <a:font script="Beng" typeface="Vrinda"/>
-        <a:font script="Gujr" typeface="Shruti"/>
-        <a:font script="Khmr" typeface="MoolBoran"/>
-        <a:font script="Knda" typeface="Tunga"/>
-        <a:font script="Guru" typeface="Raavi"/>
-        <a:font script="Cans" typeface="Euphemia"/>
-        <a:font script="Cher" typeface="Plantagenet Cherokee"/>
-        <a:font script="Yiii" typeface="Microsoft Yi Baiti"/>
-        <a:font script="Tibt" typeface="Microsoft Himalaya"/>
-        <a:font script="Thaa" typeface="MV Boli"/>
-        <a:font script="Deva" typeface="Mangal"/>
-        <a:font script="Telu" typeface="Gautami"/>
-        <a:font script="Taml" typeface="Latha"/>
-        <a:font script="Syrc" typeface="Estrangelo Edessa"/>
-        <a:font script="Orya" typeface="Kalinga"/>
-        <a:font script="Mlym" typeface="Kartika"/>
-        <a:font script="Laoo" typeface="DokChampa"/>
-        <a:font script="Sinh" typeface="Iskoola Pota"/>
-        <a:font script="Mong" typeface="Mongolian Baiti"/>
-        <a:font script="Viet" typeface="Times New Roman"/>
-        <a:font script="Uigh" typeface="Microsoft Uighur"/>
-        <a:font script="Geor" typeface="Sylfaen"/>
-      </a:majorFont>
-      <a:minorFont>
-        <a:latin typeface="Arial"/>
-        <a:ea typeface=""/>
-        <a:cs typeface=""/>
-        <a:font script="Jpan" typeface="ＭＳ Ｐゴシック"/>
-        <a:font script="Hang" typeface="맑은 고딕"/>
-        <a:font script="Hans" typeface="宋体"/>
-        <a:font script="Hant" typeface="新細明體"/>
-        <a:font script="Arab" typeface="Arial"/>
-        <a:font script="Hebr" typeface="Arial"/>
-        <a:font script="Thai" typeface="Cordia New"/>
-        <a:font script="Ethi" typeface="Nyala"/>
-        <a:font script="Beng" typeface="Vrinda"/>
-        <a:font script="Gujr" typeface="Shruti"/>
-        <a:font script="Khmr" typeface="DaunPenh"/>
-        <a:font script="Knda" typeface="Tunga"/>
-        <a:font script="Guru" typeface="Raavi"/>
-        <a:font script="Cans" typeface="Euphemia"/>
-        <a:font script="Cher" typeface="Plantagenet Cherokee"/>
-        <a:font script="Yiii" typeface="Microsoft Yi Baiti"/>
-        <a:font script="Tibt" typeface="Microsoft Himalaya"/>
-        <a:font script="Thaa" typeface="MV Boli"/>
-        <a:font script="Deva" typeface="Mangal"/>
-        <a:font script="Telu" typeface="Gautami"/>
-        <a:font script="Taml" typeface="Latha"/>
-        <a:font script="Syrc" typeface="Estrangelo Edessa"/>
-        <a:font script="Orya" typeface="Kalinga"/>
-        <a:font script="Mlym" typeface="Kartika"/>
-        <a:font script="Laoo" typeface="DokChampa"/>
-        <a:font script="Sinh" typeface="Iskoola Pota"/>
-        <a:font script="Mong" typeface="Mongolian Baiti"/>
-        <a:font script="Viet" typeface="Arial"/>
-        <a:font script="Uigh" typeface="Microsoft Uighur"/>
-        <a:font script="Geor" typeface="Sylfaen"/>
-      </a:minorFont>
-    </a:fontScheme>
-    <a:fmtScheme name="Office">
-      <a:fillStyleLst>
-        <a:solidFill>
-          <a:schemeClr val="phClr"/>
-        </a:solidFill>
-        <a:gradFill rotWithShape="1">
-          <a:gsLst>
-            <a:gs pos="0">
-              <a:schemeClr val="phClr">
-                <a:tint val="50000"/>
-                <a:satMod val="300000"/>
-              </a:schemeClr>
-            </a:gs>
-            <a:gs pos="35000">
-              <a:schemeClr val="phClr">
-                <a:tint val="37000"/>
-                <a:satMod val="300000"/>
-              </a:schemeClr>
-            </a:gs>
-            <a:gs pos="100000">
-              <a:schemeClr val="phClr">
-                <a:tint val="15000"/>
-                <a:satMod val="350000"/>
-              </a:schemeClr>
-            </a:gs>
-          </a:gsLst>
-          <a:lin ang="16200000" scaled="1"/>
-        </a:gradFill>
-        <a:gradFill rotWithShape="1">
-          <a:gsLst>
-            <a:gs pos="0">
-              <a:schemeClr val="phClr">
-                <a:tint val="100000"/>
-                <a:shade val="100000"/>
-                <a:satMod val="130000"/>
-              </a:schemeClr>
-            </a:gs>
-            <a:gs pos="100000">
-              <a:schemeClr val="phClr">
-                <a:tint val="50000"/>
-                <a:shade val="100000"/>
-                <a:satMod val="350000"/>
-              </a:schemeClr>
-            </a:gs>
-          </a:gsLst>
-          <a:lin ang="16200000" scaled="0"/>
-        </a:gradFill>
-      </a:fillStyleLst>
-      <a:lnStyleLst>
-        <a:ln w="9525" cap="flat" cmpd="sng" algn="ctr">
-          <a:solidFill>
-            <a:schemeClr val="phClr">
-              <a:shade val="95000"/>
-              <a:satMod val="105000"/>
-            </a:schemeClr>
-          </a:solidFill>
-          <a:prstDash val="solid"/>
-        </a:ln>
-        <a:ln w="25400" cap="flat" cmpd="sng" algn="ctr">
-          <a:solidFill>
-            <a:schemeClr val="phClr"/>
-          </a:solidFill>
-          <a:prstDash val="solid"/>
-        </a:ln>
-        <a:ln w="38100" cap="flat" cmpd="sng" algn="ctr">
-          <a:solidFill>
-            <a:schemeClr val="phClr"/>
-          </a:solidFill>
-          <a:prstDash val="solid"/>
-        </a:ln>
-      </a:lnStyleLst>
-      <a:effectStyleLst>
-        <a:effectStyle>
-          <a:effectLst>
-            <a:outerShdw blurRad="40000" dist="20000" dir="5400000" rotWithShape="0">
-              <a:srgbClr val="000000">
-                <a:alpha val="38000"/>
-              </a:srgbClr>
-            </a:outerShdw>
-          </a:effectLst>
-        </a:effectStyle>
-        <a:effectStyle>
-          <a:effectLst>
-            <a:outerShdw blurRad="40000" dist="23000" dir="5400000" rotWithShape="0">
-              <a:srgbClr val="000000">
-                <a:alpha val="35000"/>
-              </a:srgbClr>
-            </a:outerShdw>
-          </a:effectLst>
-        </a:effectStyle>
-        <a:effectStyle>
-          <a:effectLst>
-            <a:outerShdw blurRad="40000" dist="23000" dir="5400000" rotWithShape="0">
-              <a:srgbClr val="000000">
-                <a:alpha val="35000"/>
-              </a:srgbClr>
-            </a:outerShdw>
-          </a:effectLst>
-          <a:scene3d>
-            <a:camera prst="orthographicFront">
-              <a:rot lat="0" lon="0" rev="0"/>
-            </a:camera>
-            <a:lightRig rig="threePt" dir="t">
-              <a:rot lat="0" lon="0" rev="1200000"/>
-            </a:lightRig>
-          </a:scene3d>
-          <a:sp3d>
-            <a:bevelT w="63500" h="25400"/>
-          </a:sp3d>
-        </a:effectStyle>
-      </a:effectStyleLst>
-      <a:bgFillStyleLst>
-        <a:solidFill>
-          <a:schemeClr val="phClr"/>
-        </a:solidFill>
-        <a:gradFill rotWithShape="1">
-          <a:gsLst>
-            <a:gs pos="0">
-              <a:schemeClr val="phClr">
-                <a:tint val="40000"/>
-                <a:satMod val="350000"/>
-              </a:schemeClr>
-            </a:gs>
-            <a:gs pos="40000">
-              <a:schemeClr val="phClr">
-                <a:tint val="45000"/>
-                <a:shade val="99000"/>
-                <a:satMod val="350000"/>
-              </a:schemeClr>
-            </a:gs>
-            <a:gs pos="100000">
-              <a:schemeClr val="phClr">
-                <a:shade val="20000"/>
-                <a:satMod val="255000"/>
-              </a:schemeClr>
-            </a:gs>
-          </a:gsLst>
-          <a:path path="circle">
-            <a:fillToRect l="50000" t="-80000" r="50000" b="180000"/>
-          </a:path>
-        </a:gradFill>
-        <a:gradFill rotWithShape="1">
-          <a:gsLst>
-            <a:gs pos="0">
-              <a:schemeClr val="phClr">
-                <a:tint val="80000"/>
-                <a:satMod val="300000"/>
-              </a:schemeClr>
-            </a:gs>
-            <a:gs pos="100000">
-              <a:schemeClr val="phClr">
-                <a:shade val="30000"/>
-                <a:satMod val="200000"/>
-              </a:schemeClr>
-            </a:gs>
-          </a:gsLst>
-          <a:path path="circle">
-            <a:fillToRect l="50000" t="50000" r="50000" b="50000"/>
-          </a:path>
-        </a:gradFill>
-      </a:bgFillStyleLst>
-    </a:fmtScheme>
-  </a:themeElements>
-</a:theme>
 </file>
</xml_diff>

<commit_message>
Correção dos artefatos para a prova final
</commit_message>
<xml_diff>
--- a/Artefatos/15 -Arquitetura de Negócio para cada Cenário.pptx
+++ b/Artefatos/15 -Arquitetura de Negócio para cada Cenário.pptx
@@ -12,7 +12,6 @@
     <p:sldId id="257" r:id="rId7"/>
     <p:sldId id="258" r:id="rId8"/>
     <p:sldId id="259" r:id="rId9"/>
-    <p:sldId id="260" r:id="rId10"/>
   </p:sldIdLst>
   <p:sldSz cy="5143500" cx="9144000"/>
   <p:notesSz cx="6858000" cy="9144000"/>
@@ -1042,105 +1041,6 @@
       <p:sp>
         <p:nvSpPr>
           <p:cNvPr id="99" name="Google Shape;99;g951f6f1f16_1_13:notes"/>
-          <p:cNvSpPr txBox="1"/>
-          <p:nvPr>
-            <p:ph idx="1" type="body"/>
-          </p:nvPr>
-        </p:nvSpPr>
-        <p:spPr>
-          <a:xfrm>
-            <a:off x="685800" y="4343400"/>
-            <a:ext cx="5486400" cy="4114800"/>
-          </a:xfrm>
-          <a:prstGeom prst="rect">
-            <a:avLst/>
-          </a:prstGeom>
-        </p:spPr>
-        <p:txBody>
-          <a:bodyPr anchorCtr="0" anchor="t" bIns="91425" lIns="91425" spcFirstLastPara="1" rIns="91425" wrap="square" tIns="91425">
-            <a:noAutofit/>
-          </a:bodyPr>
-          <a:lstStyle/>
-          <a:p>
-            <a:pPr indent="0" lvl="0" marL="0" rtl="0" algn="l">
-              <a:spcBef>
-                <a:spcPts val="0"/>
-              </a:spcBef>
-              <a:spcAft>
-                <a:spcPts val="0"/>
-              </a:spcAft>
-              <a:buNone/>
-            </a:pPr>
-            <a:r>
-              <a:t/>
-            </a:r>
-            <a:endParaRPr/>
-          </a:p>
-        </p:txBody>
-      </p:sp>
-    </p:spTree>
-  </p:cSld>
-  <p:clrMapOvr>
-    <a:masterClrMapping/>
-  </p:clrMapOvr>
-</p:notes>
-</file>
-
-<file path=ppt/notesSlides/notesSlide5.xml><?xml version="1.0" encoding="utf-8"?>
-<p:notes xmlns:a="http://schemas.openxmlformats.org/drawingml/2006/main" xmlns:r="http://schemas.openxmlformats.org/officeDocument/2006/relationships" xmlns:mc="http://schemas.openxmlformats.org/markup-compatibility/2006" xmlns:mv="urn:schemas-microsoft-com:mac:vml" xmlns:p="http://schemas.openxmlformats.org/presentationml/2006/main" xmlns:c="http://schemas.openxmlformats.org/drawingml/2006/chart" xmlns:dgm="http://schemas.openxmlformats.org/drawingml/2006/diagram" xmlns:o="urn:schemas-microsoft-com:office:office" xmlns:v="urn:schemas-microsoft-com:vml" xmlns:pvml="urn:schemas-microsoft-com:office:powerpoint" xmlns:com="http://schemas.openxmlformats.org/drawingml/2006/compatibility" xmlns:p14="http://schemas.microsoft.com/office/powerpoint/2010/main" xmlns:p15="http://schemas.microsoft.com/office/powerpoint/2012/main" xmlns:ahyp="http://schemas.microsoft.com/office/drawing/2018/hyperlinkcolor" showMasterPhAnim="0" showMasterSp="0">
-  <p:cSld>
-    <p:spTree>
-      <p:nvGrpSpPr>
-        <p:cNvPr id="114" name="Shape 114"/>
-        <p:cNvGrpSpPr/>
-        <p:nvPr/>
-      </p:nvGrpSpPr>
-      <p:grpSpPr>
-        <a:xfrm>
-          <a:off x="0" y="0"/>
-          <a:ext cx="0" cy="0"/>
-          <a:chOff x="0" y="0"/>
-          <a:chExt cx="0" cy="0"/>
-        </a:xfrm>
-      </p:grpSpPr>
-      <p:sp>
-        <p:nvSpPr>
-          <p:cNvPr id="115" name="Google Shape;115;ga9b9600433_0_5:notes"/>
-          <p:cNvSpPr/>
-          <p:nvPr>
-            <p:ph idx="2" type="sldImg"/>
-          </p:nvPr>
-        </p:nvSpPr>
-        <p:spPr>
-          <a:xfrm>
-            <a:off x="381300" y="685800"/>
-            <a:ext cx="6096000" cy="3429000"/>
-          </a:xfrm>
-          <a:custGeom>
-            <a:rect b="b" l="l" r="r" t="t"/>
-            <a:pathLst>
-              <a:path extrusionOk="0" h="120000" w="120000">
-                <a:moveTo>
-                  <a:pt x="0" y="0"/>
-                </a:moveTo>
-                <a:lnTo>
-                  <a:pt x="120000" y="0"/>
-                </a:lnTo>
-                <a:lnTo>
-                  <a:pt x="120000" y="120000"/>
-                </a:lnTo>
-                <a:lnTo>
-                  <a:pt x="0" y="120000"/>
-                </a:lnTo>
-                <a:close/>
-              </a:path>
-            </a:pathLst>
-          </a:custGeom>
-        </p:spPr>
-      </p:sp>
-      <p:sp>
-        <p:nvSpPr>
-          <p:cNvPr id="116" name="Google Shape;116;ga9b9600433_0_5:notes"/>
           <p:cNvSpPr txBox="1"/>
           <p:nvPr>
             <p:ph idx="1" type="body"/>
@@ -6124,8 +6024,8 @@
         </p:nvSpPr>
         <p:spPr>
           <a:xfrm>
-            <a:off x="2535550" y="1640675"/>
-            <a:ext cx="3394500" cy="692700"/>
+            <a:off x="2535550" y="1532825"/>
+            <a:ext cx="3394500" cy="794700"/>
           </a:xfrm>
           <a:prstGeom prst="rect">
             <a:avLst/>
@@ -6182,7 +6082,11 @@
               </a:rPr>
               <a:t>Comprar produtos inteiros.</a:t>
             </a:r>
-            <a:endParaRPr/>
+            <a:endParaRPr>
+              <a:solidFill>
+                <a:schemeClr val="dk1"/>
+              </a:solidFill>
+            </a:endParaRPr>
           </a:p>
           <a:p>
             <a:pPr indent="0" lvl="0" marL="0" rtl="0" algn="l">
@@ -6195,16 +6099,16 @@
               <a:buNone/>
             </a:pPr>
             <a:r>
-              <a:rPr lang="pt-BR"/>
-              <a:t>3. Enviar </a:t>
+              <a:rPr lang="pt-BR">
+                <a:solidFill>
+                  <a:schemeClr val="dk1"/>
+                </a:solidFill>
+              </a:rPr>
+              <a:t>3. Acompanhamento.</a:t>
             </a:r>
             <a:r>
               <a:rPr lang="pt-BR"/>
-              <a:t>relatório</a:t>
-            </a:r>
-            <a:r>
-              <a:rPr lang="pt-BR"/>
-              <a:t> nutricional.          </a:t>
+              <a:t>       </a:t>
             </a:r>
             <a:endParaRPr/>
           </a:p>
@@ -8025,584 +7929,6 @@
             <a:r>
               <a:rPr lang="pt-BR" sz="1100"/>
               <a:t>BÁRBARA</a:t>
-            </a:r>
-            <a:endParaRPr sz="1100"/>
-          </a:p>
-        </p:txBody>
-      </p:sp>
-    </p:spTree>
-  </p:cSld>
-  <p:clrMapOvr>
-    <a:masterClrMapping/>
-  </p:clrMapOvr>
-</p:sld>
-</file>
-
-<file path=ppt/slides/slide5.xml><?xml version="1.0" encoding="utf-8"?>
-<p:sld xmlns:a="http://schemas.openxmlformats.org/drawingml/2006/main" xmlns:r="http://schemas.openxmlformats.org/officeDocument/2006/relationships" xmlns:mc="http://schemas.openxmlformats.org/markup-compatibility/2006" xmlns:mv="urn:schemas-microsoft-com:mac:vml" xmlns:p="http://schemas.openxmlformats.org/presentationml/2006/main" xmlns:c="http://schemas.openxmlformats.org/drawingml/2006/chart" xmlns:dgm="http://schemas.openxmlformats.org/drawingml/2006/diagram" xmlns:o="urn:schemas-microsoft-com:office:office" xmlns:v="urn:schemas-microsoft-com:vml" xmlns:pvml="urn:schemas-microsoft-com:office:powerpoint" xmlns:com="http://schemas.openxmlformats.org/drawingml/2006/compatibility" xmlns:p14="http://schemas.microsoft.com/office/powerpoint/2010/main" xmlns:p15="http://schemas.microsoft.com/office/powerpoint/2012/main" xmlns:ahyp="http://schemas.microsoft.com/office/drawing/2018/hyperlinkcolor">
-  <p:cSld>
-    <p:spTree>
-      <p:nvGrpSpPr>
-        <p:cNvPr id="117" name="Shape 117"/>
-        <p:cNvGrpSpPr/>
-        <p:nvPr/>
-      </p:nvGrpSpPr>
-      <p:grpSpPr>
-        <a:xfrm>
-          <a:off x="0" y="0"/>
-          <a:ext cx="0" cy="0"/>
-          <a:chOff x="0" y="0"/>
-          <a:chExt cx="0" cy="0"/>
-        </a:xfrm>
-      </p:grpSpPr>
-      <p:sp>
-        <p:nvSpPr>
-          <p:cNvPr id="118" name="Google Shape;118;p17"/>
-          <p:cNvSpPr txBox="1"/>
-          <p:nvPr/>
-        </p:nvSpPr>
-        <p:spPr>
-          <a:xfrm>
-            <a:off x="217325" y="271675"/>
-            <a:ext cx="5403000" cy="579600"/>
-          </a:xfrm>
-          <a:prstGeom prst="rect">
-            <a:avLst/>
-          </a:prstGeom>
-          <a:noFill/>
-          <a:ln>
-            <a:noFill/>
-          </a:ln>
-        </p:spPr>
-        <p:txBody>
-          <a:bodyPr anchorCtr="0" anchor="t" bIns="91425" lIns="91425" spcFirstLastPara="1" rIns="91425" wrap="square" tIns="91425">
-            <a:noAutofit/>
-          </a:bodyPr>
-          <a:lstStyle/>
-          <a:p>
-            <a:pPr indent="0" lvl="0" marL="0" rtl="0" algn="l">
-              <a:spcBef>
-                <a:spcPts val="0"/>
-              </a:spcBef>
-              <a:spcAft>
-                <a:spcPts val="0"/>
-              </a:spcAft>
-              <a:buNone/>
-            </a:pPr>
-            <a:r>
-              <a:rPr lang="pt-BR" sz="2900"/>
-              <a:t>Cenário:</a:t>
-            </a:r>
-            <a:r>
-              <a:rPr lang="pt-BR" sz="2200"/>
-              <a:t>Enviar relatório nutricional.</a:t>
-            </a:r>
-            <a:endParaRPr sz="2200"/>
-          </a:p>
-        </p:txBody>
-      </p:sp>
-      <p:sp>
-        <p:nvSpPr>
-          <p:cNvPr id="119" name="Google Shape;119;p17"/>
-          <p:cNvSpPr/>
-          <p:nvPr/>
-        </p:nvSpPr>
-        <p:spPr>
-          <a:xfrm>
-            <a:off x="6097300" y="1510050"/>
-            <a:ext cx="2475300" cy="2123400"/>
-          </a:xfrm>
-          <a:prstGeom prst="roundRect">
-            <a:avLst>
-              <a:gd fmla="val 16667" name="adj"/>
-            </a:avLst>
-          </a:prstGeom>
-          <a:noFill/>
-          <a:ln cap="flat" cmpd="sng" w="9525">
-            <a:solidFill>
-              <a:srgbClr val="0000FF"/>
-            </a:solidFill>
-            <a:prstDash val="solid"/>
-            <a:round/>
-            <a:headEnd len="sm" w="sm" type="none"/>
-            <a:tailEnd len="sm" w="sm" type="none"/>
-          </a:ln>
-        </p:spPr>
-        <p:txBody>
-          <a:bodyPr anchorCtr="0" anchor="ctr" bIns="91425" lIns="91425" spcFirstLastPara="1" rIns="91425" wrap="square" tIns="91425">
-            <a:noAutofit/>
-          </a:bodyPr>
-          <a:lstStyle/>
-          <a:p>
-            <a:pPr indent="0" lvl="0" marL="0" rtl="0" algn="l">
-              <a:spcBef>
-                <a:spcPts val="0"/>
-              </a:spcBef>
-              <a:spcAft>
-                <a:spcPts val="0"/>
-              </a:spcAft>
-              <a:buNone/>
-            </a:pPr>
-            <a:r>
-              <a:t/>
-            </a:r>
-            <a:endParaRPr/>
-          </a:p>
-        </p:txBody>
-      </p:sp>
-      <p:sp>
-        <p:nvSpPr>
-          <p:cNvPr id="120" name="Google Shape;120;p17"/>
-          <p:cNvSpPr/>
-          <p:nvPr/>
-        </p:nvSpPr>
-        <p:spPr>
-          <a:xfrm>
-            <a:off x="874250" y="1862225"/>
-            <a:ext cx="1146900" cy="794700"/>
-          </a:xfrm>
-          <a:prstGeom prst="rect">
-            <a:avLst/>
-          </a:prstGeom>
-          <a:solidFill>
-            <a:srgbClr val="5A5AD2"/>
-          </a:solidFill>
-          <a:ln cap="flat" cmpd="sng" w="9525">
-            <a:solidFill>
-              <a:srgbClr val="0000FF"/>
-            </a:solidFill>
-            <a:prstDash val="solid"/>
-            <a:round/>
-            <a:headEnd len="sm" w="sm" type="none"/>
-            <a:tailEnd len="sm" w="sm" type="none"/>
-          </a:ln>
-        </p:spPr>
-        <p:txBody>
-          <a:bodyPr anchorCtr="0" anchor="ctr" bIns="91425" lIns="91425" spcFirstLastPara="1" rIns="91425" wrap="square" tIns="91425">
-            <a:noAutofit/>
-          </a:bodyPr>
-          <a:lstStyle/>
-          <a:p>
-            <a:pPr indent="0" lvl="0" marL="0" rtl="0" algn="l">
-              <a:spcBef>
-                <a:spcPts val="0"/>
-              </a:spcBef>
-              <a:spcAft>
-                <a:spcPts val="0"/>
-              </a:spcAft>
-              <a:buNone/>
-            </a:pPr>
-            <a:r>
-              <a:t/>
-            </a:r>
-            <a:endParaRPr>
-              <a:solidFill>
-                <a:srgbClr val="0000FF"/>
-              </a:solidFill>
-            </a:endParaRPr>
-          </a:p>
-        </p:txBody>
-      </p:sp>
-      <p:sp>
-        <p:nvSpPr>
-          <p:cNvPr id="121" name="Google Shape;121;p17"/>
-          <p:cNvSpPr txBox="1"/>
-          <p:nvPr/>
-        </p:nvSpPr>
-        <p:spPr>
-          <a:xfrm>
-            <a:off x="1056050" y="2026925"/>
-            <a:ext cx="783300" cy="204300"/>
-          </a:xfrm>
-          <a:prstGeom prst="rect">
-            <a:avLst/>
-          </a:prstGeom>
-          <a:noFill/>
-          <a:ln>
-            <a:noFill/>
-          </a:ln>
-        </p:spPr>
-        <p:txBody>
-          <a:bodyPr anchorCtr="0" anchor="t" bIns="91425" lIns="91425" spcFirstLastPara="1" rIns="91425" wrap="square" tIns="91425">
-            <a:noAutofit/>
-          </a:bodyPr>
-          <a:lstStyle/>
-          <a:p>
-            <a:pPr indent="0" lvl="0" marL="0" rtl="0" algn="l">
-              <a:spcBef>
-                <a:spcPts val="0"/>
-              </a:spcBef>
-              <a:spcAft>
-                <a:spcPts val="0"/>
-              </a:spcAft>
-              <a:buNone/>
-            </a:pPr>
-            <a:r>
-              <a:rPr lang="pt-BR">
-                <a:solidFill>
-                  <a:srgbClr val="FFFFFF"/>
-                </a:solidFill>
-              </a:rPr>
-              <a:t>Cliente</a:t>
-            </a:r>
-            <a:endParaRPr>
-              <a:solidFill>
-                <a:srgbClr val="FFFFFF"/>
-              </a:solidFill>
-            </a:endParaRPr>
-          </a:p>
-        </p:txBody>
-      </p:sp>
-      <p:sp>
-        <p:nvSpPr>
-          <p:cNvPr id="122" name="Google Shape;122;p17"/>
-          <p:cNvSpPr/>
-          <p:nvPr/>
-        </p:nvSpPr>
-        <p:spPr>
-          <a:xfrm>
-            <a:off x="6574150" y="1878725"/>
-            <a:ext cx="1737300" cy="579600"/>
-          </a:xfrm>
-          <a:prstGeom prst="cube">
-            <a:avLst>
-              <a:gd fmla="val 25000" name="adj"/>
-            </a:avLst>
-          </a:prstGeom>
-          <a:solidFill>
-            <a:srgbClr val="FFFF00"/>
-          </a:solidFill>
-          <a:ln cap="flat" cmpd="sng" w="9525">
-            <a:solidFill>
-              <a:schemeClr val="dk2"/>
-            </a:solidFill>
-            <a:prstDash val="solid"/>
-            <a:round/>
-            <a:headEnd len="sm" w="sm" type="none"/>
-            <a:tailEnd len="sm" w="sm" type="none"/>
-          </a:ln>
-        </p:spPr>
-        <p:txBody>
-          <a:bodyPr anchorCtr="0" anchor="ctr" bIns="91425" lIns="91425" spcFirstLastPara="1" rIns="91425" wrap="square" tIns="91425">
-            <a:noAutofit/>
-          </a:bodyPr>
-          <a:lstStyle/>
-          <a:p>
-            <a:pPr indent="0" lvl="0" marL="0" rtl="0" algn="l">
-              <a:spcBef>
-                <a:spcPts val="0"/>
-              </a:spcBef>
-              <a:spcAft>
-                <a:spcPts val="0"/>
-              </a:spcAft>
-              <a:buNone/>
-            </a:pPr>
-            <a:r>
-              <a:rPr lang="pt-BR" sz="1200"/>
-              <a:t>Setor de Nutrição</a:t>
-            </a:r>
-            <a:br>
-              <a:rPr lang="pt-BR" sz="1200"/>
-            </a:br>
-            <a:r>
-              <a:rPr lang="pt-BR" sz="1200"/>
-              <a:t>(Nó operacional)</a:t>
-            </a:r>
-            <a:endParaRPr sz="1200"/>
-          </a:p>
-        </p:txBody>
-      </p:sp>
-      <p:cxnSp>
-        <p:nvCxnSpPr>
-          <p:cNvPr id="123" name="Google Shape;123;p17"/>
-          <p:cNvCxnSpPr>
-            <a:stCxn id="120" idx="3"/>
-            <a:endCxn id="122" idx="2"/>
-          </p:cNvCxnSpPr>
-          <p:nvPr/>
-        </p:nvCxnSpPr>
-        <p:spPr>
-          <a:xfrm flipH="1" rot="10800000">
-            <a:off x="2021150" y="2240975"/>
-            <a:ext cx="4553100" cy="18600"/>
-          </a:xfrm>
-          <a:prstGeom prst="straightConnector1">
-            <a:avLst/>
-          </a:prstGeom>
-          <a:noFill/>
-          <a:ln cap="flat" cmpd="sng" w="9525">
-            <a:solidFill>
-              <a:schemeClr val="dk2"/>
-            </a:solidFill>
-            <a:prstDash val="solid"/>
-            <a:round/>
-            <a:headEnd len="med" w="med" type="none"/>
-            <a:tailEnd len="med" w="med" type="none"/>
-          </a:ln>
-        </p:spPr>
-      </p:cxnSp>
-      <p:sp>
-        <p:nvSpPr>
-          <p:cNvPr id="124" name="Google Shape;124;p17"/>
-          <p:cNvSpPr/>
-          <p:nvPr/>
-        </p:nvSpPr>
-        <p:spPr>
-          <a:xfrm>
-            <a:off x="6836950" y="2770975"/>
-            <a:ext cx="996000" cy="692700"/>
-          </a:xfrm>
-          <a:prstGeom prst="rect">
-            <a:avLst/>
-          </a:prstGeom>
-          <a:solidFill>
-            <a:srgbClr val="FFD966"/>
-          </a:solidFill>
-          <a:ln cap="flat" cmpd="sng" w="9525">
-            <a:solidFill>
-              <a:schemeClr val="dk2"/>
-            </a:solidFill>
-            <a:prstDash val="solid"/>
-            <a:round/>
-            <a:headEnd len="sm" w="sm" type="none"/>
-            <a:tailEnd len="sm" w="sm" type="none"/>
-          </a:ln>
-        </p:spPr>
-        <p:txBody>
-          <a:bodyPr anchorCtr="0" anchor="ctr" bIns="91425" lIns="91425" spcFirstLastPara="1" rIns="91425" wrap="square" tIns="91425">
-            <a:noAutofit/>
-          </a:bodyPr>
-          <a:lstStyle/>
-          <a:p>
-            <a:pPr indent="0" lvl="0" marL="0" rtl="0" algn="l">
-              <a:spcBef>
-                <a:spcPts val="0"/>
-              </a:spcBef>
-              <a:spcAft>
-                <a:spcPts val="0"/>
-              </a:spcAft>
-              <a:buNone/>
-            </a:pPr>
-            <a:r>
-              <a:t/>
-            </a:r>
-            <a:endParaRPr/>
-          </a:p>
-        </p:txBody>
-      </p:sp>
-      <p:cxnSp>
-        <p:nvCxnSpPr>
-          <p:cNvPr id="125" name="Google Shape;125;p17"/>
-          <p:cNvCxnSpPr/>
-          <p:nvPr/>
-        </p:nvCxnSpPr>
-        <p:spPr>
-          <a:xfrm>
-            <a:off x="7588475" y="3024525"/>
-            <a:ext cx="0" cy="0"/>
-          </a:xfrm>
-          <a:prstGeom prst="straightConnector1">
-            <a:avLst/>
-          </a:prstGeom>
-          <a:noFill/>
-          <a:ln cap="flat" cmpd="sng" w="9525">
-            <a:solidFill>
-              <a:schemeClr val="dk2"/>
-            </a:solidFill>
-            <a:prstDash val="solid"/>
-            <a:round/>
-            <a:headEnd len="med" w="med" type="none"/>
-            <a:tailEnd len="med" w="med" type="none"/>
-          </a:ln>
-        </p:spPr>
-      </p:cxnSp>
-      <p:sp>
-        <p:nvSpPr>
-          <p:cNvPr id="126" name="Google Shape;126;p17"/>
-          <p:cNvSpPr txBox="1"/>
-          <p:nvPr/>
-        </p:nvSpPr>
-        <p:spPr>
-          <a:xfrm>
-            <a:off x="1792975" y="3314300"/>
-            <a:ext cx="144900" cy="454200"/>
-          </a:xfrm>
-          <a:prstGeom prst="rect">
-            <a:avLst/>
-          </a:prstGeom>
-          <a:noFill/>
-          <a:ln>
-            <a:noFill/>
-          </a:ln>
-        </p:spPr>
-        <p:txBody>
-          <a:bodyPr anchorCtr="0" anchor="t" bIns="91425" lIns="91425" spcFirstLastPara="1" rIns="91425" wrap="square" tIns="91425">
-            <a:noAutofit/>
-          </a:bodyPr>
-          <a:lstStyle/>
-          <a:p>
-            <a:pPr indent="0" lvl="0" marL="0" rtl="0" algn="l">
-              <a:spcBef>
-                <a:spcPts val="0"/>
-              </a:spcBef>
-              <a:spcAft>
-                <a:spcPts val="0"/>
-              </a:spcAft>
-              <a:buNone/>
-            </a:pPr>
-            <a:r>
-              <a:t/>
-            </a:r>
-            <a:endParaRPr/>
-          </a:p>
-        </p:txBody>
-      </p:sp>
-      <p:sp>
-        <p:nvSpPr>
-          <p:cNvPr id="127" name="Google Shape;127;p17"/>
-          <p:cNvSpPr txBox="1"/>
-          <p:nvPr/>
-        </p:nvSpPr>
-        <p:spPr>
-          <a:xfrm>
-            <a:off x="1122875" y="3477300"/>
-            <a:ext cx="1847400" cy="579600"/>
-          </a:xfrm>
-          <a:prstGeom prst="rect">
-            <a:avLst/>
-          </a:prstGeom>
-          <a:noFill/>
-          <a:ln>
-            <a:noFill/>
-          </a:ln>
-        </p:spPr>
-        <p:txBody>
-          <a:bodyPr anchorCtr="0" anchor="t" bIns="91425" lIns="91425" spcFirstLastPara="1" rIns="91425" wrap="square" tIns="91425">
-            <a:noAutofit/>
-          </a:bodyPr>
-          <a:lstStyle/>
-          <a:p>
-            <a:pPr indent="0" lvl="0" marL="0" rtl="0" algn="l">
-              <a:spcBef>
-                <a:spcPts val="0"/>
-              </a:spcBef>
-              <a:spcAft>
-                <a:spcPts val="0"/>
-              </a:spcAft>
-              <a:buNone/>
-            </a:pPr>
-            <a:r>
-              <a:t/>
-            </a:r>
-            <a:endParaRPr sz="1000"/>
-          </a:p>
-        </p:txBody>
-      </p:sp>
-      <p:sp>
-        <p:nvSpPr>
-          <p:cNvPr id="128" name="Google Shape;128;p17"/>
-          <p:cNvSpPr txBox="1"/>
-          <p:nvPr/>
-        </p:nvSpPr>
-        <p:spPr>
-          <a:xfrm>
-            <a:off x="6943300" y="2770975"/>
-            <a:ext cx="783300" cy="692700"/>
-          </a:xfrm>
-          <a:prstGeom prst="rect">
-            <a:avLst/>
-          </a:prstGeom>
-          <a:noFill/>
-          <a:ln>
-            <a:noFill/>
-          </a:ln>
-        </p:spPr>
-        <p:txBody>
-          <a:bodyPr anchorCtr="0" anchor="t" bIns="91425" lIns="91425" spcFirstLastPara="1" rIns="91425" wrap="square" tIns="91425">
-            <a:noAutofit/>
-          </a:bodyPr>
-          <a:lstStyle/>
-          <a:p>
-            <a:pPr indent="0" lvl="0" marL="0" rtl="0" algn="l">
-              <a:spcBef>
-                <a:spcPts val="0"/>
-              </a:spcBef>
-              <a:spcAft>
-                <a:spcPts val="0"/>
-              </a:spcAft>
-              <a:buNone/>
-            </a:pPr>
-            <a:r>
-              <a:rPr lang="pt-BR" sz="1000"/>
-              <a:t>Tratar da nutrição do cliente</a:t>
-            </a:r>
-            <a:endParaRPr sz="1000"/>
-          </a:p>
-        </p:txBody>
-      </p:sp>
-      <p:cxnSp>
-        <p:nvCxnSpPr>
-          <p:cNvPr id="129" name="Google Shape;129;p17"/>
-          <p:cNvCxnSpPr/>
-          <p:nvPr/>
-        </p:nvCxnSpPr>
-        <p:spPr>
-          <a:xfrm>
-            <a:off x="7400200" y="2458325"/>
-            <a:ext cx="5700" cy="321000"/>
-          </a:xfrm>
-          <a:prstGeom prst="straightConnector1">
-            <a:avLst/>
-          </a:prstGeom>
-          <a:noFill/>
-          <a:ln cap="flat" cmpd="sng" w="9525">
-            <a:solidFill>
-              <a:schemeClr val="dk2"/>
-            </a:solidFill>
-            <a:prstDash val="solid"/>
-            <a:round/>
-            <a:headEnd len="med" w="med" type="none"/>
-            <a:tailEnd len="med" w="med" type="none"/>
-          </a:ln>
-        </p:spPr>
-      </p:cxnSp>
-      <p:sp>
-        <p:nvSpPr>
-          <p:cNvPr id="130" name="Google Shape;130;p17"/>
-          <p:cNvSpPr txBox="1"/>
-          <p:nvPr/>
-        </p:nvSpPr>
-        <p:spPr>
-          <a:xfrm>
-            <a:off x="6444450" y="1532825"/>
-            <a:ext cx="1969200" cy="403200"/>
-          </a:xfrm>
-          <a:prstGeom prst="rect">
-            <a:avLst/>
-          </a:prstGeom>
-          <a:noFill/>
-          <a:ln>
-            <a:noFill/>
-          </a:ln>
-        </p:spPr>
-        <p:txBody>
-          <a:bodyPr anchorCtr="0" anchor="t" bIns="91425" lIns="91425" spcFirstLastPara="1" rIns="91425" wrap="square" tIns="91425">
-            <a:noAutofit/>
-          </a:bodyPr>
-          <a:lstStyle/>
-          <a:p>
-            <a:pPr indent="0" lvl="0" marL="0" rtl="0" algn="l">
-              <a:spcBef>
-                <a:spcPts val="0"/>
-              </a:spcBef>
-              <a:spcAft>
-                <a:spcPts val="0"/>
-              </a:spcAft>
-              <a:buNone/>
-            </a:pPr>
-            <a:r>
-              <a:rPr lang="pt-BR" sz="1100"/>
-              <a:t>EVS ADEMIR E BARBARA</a:t>
             </a:r>
             <a:endParaRPr sz="1100"/>
           </a:p>

</xml_diff>